<commit_message>
Date: 21 Dec 2025
</commit_message>
<xml_diff>
--- a/Session_2_Java Basics.pptx
+++ b/Session_2_Java Basics.pptx
@@ -3242,61 +3242,61 @@
     </dgm:pt>
   </dgm:ptLst>
   <dgm:cxnLst>
+    <dgm:cxn modelId="{B5AC2237-410E-4B6E-AD5A-A9F5D576CCF5}" type="presOf" srcId="{3102626F-7CFB-4EDF-B9BC-3544295C845F}" destId="{02C0F7DE-7DEB-4728-94A8-675F08C61B61}" srcOrd="1" destOrd="0" presId="urn:microsoft.com/office/officeart/2005/8/layout/hierarchy2"/>
+    <dgm:cxn modelId="{F85939C7-B67E-47BB-BB0E-B52C42E50930}" type="presOf" srcId="{14BA256F-ABA9-49B2-A12F-ED2CCE5D97B9}" destId="{52F7C414-CE7D-4E24-891D-A5D889BDA974}" srcOrd="0" destOrd="0" presId="urn:microsoft.com/office/officeart/2005/8/layout/hierarchy2"/>
+    <dgm:cxn modelId="{08A5BC99-49D8-4B5B-AFD1-7E2B6BE57A21}" srcId="{39FFD4AA-A124-4F27-B855-D59A00435B15}" destId="{B3EEDF9C-184B-4C70-905F-CA7AFA3EF5B9}" srcOrd="2" destOrd="0" parTransId="{0367407A-B331-43A8-A835-52C1CC071464}" sibTransId="{F3B8693A-B9C7-458A-920F-76A59FF35554}"/>
+    <dgm:cxn modelId="{6CCA184D-C094-4ABC-A57D-0A327D6018EE}" type="presOf" srcId="{C64AC093-9DEB-487F-AB77-62B26E09591F}" destId="{5033B1DF-BE2C-413E-A6CD-E2F5A0863159}" srcOrd="1" destOrd="0" presId="urn:microsoft.com/office/officeart/2005/8/layout/hierarchy2"/>
+    <dgm:cxn modelId="{D1D719B4-CEE0-4AAA-8794-067783427AAB}" type="presOf" srcId="{5AB33E62-4DC7-4EE4-ACEC-3BFE7590494A}" destId="{3DA81BC4-75BC-42C3-A2A0-580D81FEA2E0}" srcOrd="1" destOrd="0" presId="urn:microsoft.com/office/officeart/2005/8/layout/hierarchy2"/>
+    <dgm:cxn modelId="{FAEFDCBF-4610-489F-9F53-C49868714BD1}" type="presOf" srcId="{181FBD91-68AB-4835-AF62-EC015CE61350}" destId="{B864B941-214B-43C6-9FDD-BA89E3CBDA31}" srcOrd="1" destOrd="0" presId="urn:microsoft.com/office/officeart/2005/8/layout/hierarchy2"/>
+    <dgm:cxn modelId="{EADCEE26-ACDC-48C5-8569-F2630DCC5ADD}" type="presOf" srcId="{DAEDCB7F-A52A-42E9-9C0B-3114E7DA4E56}" destId="{447F65B9-1F2A-4FBB-ACD1-ABFC2FCF7F43}" srcOrd="0" destOrd="0" presId="urn:microsoft.com/office/officeart/2005/8/layout/hierarchy2"/>
+    <dgm:cxn modelId="{EB8FFCB4-FAAF-4FAC-941A-8AB4B313857F}" type="presOf" srcId="{1C378682-3B14-4C41-8B7D-B4CDDC6D5C7B}" destId="{2771A3B0-FD1B-43E0-826E-9E67F9A5A78B}" srcOrd="1" destOrd="0" presId="urn:microsoft.com/office/officeart/2005/8/layout/hierarchy2"/>
+    <dgm:cxn modelId="{51A8D6DE-ED35-496F-8E86-62CB8E33A5CD}" type="presOf" srcId="{0367407A-B331-43A8-A835-52C1CC071464}" destId="{33AEF5F6-F501-4F99-815C-81CA3194CE5D}" srcOrd="1" destOrd="0" presId="urn:microsoft.com/office/officeart/2005/8/layout/hierarchy2"/>
+    <dgm:cxn modelId="{D753ABBB-DC91-4259-87AE-97752901AE68}" srcId="{B689D8DE-CF09-4329-8EBE-BF34D0405F5F}" destId="{C626744A-EE97-4D7D-9EE4-2B04E78ACB8B}" srcOrd="2" destOrd="0" parTransId="{C64AC093-9DEB-487F-AB77-62B26E09591F}" sibTransId="{A5B95C08-6F31-4AB8-8398-64F3D2FDAF14}"/>
+    <dgm:cxn modelId="{DA58D6A8-BCE9-4E46-8643-2A520AE48FA4}" srcId="{079FB288-78D8-4AE3-B7E2-74F80CAE5892}" destId="{14BA256F-ABA9-49B2-A12F-ED2CCE5D97B9}" srcOrd="0" destOrd="0" parTransId="{CB42C237-1260-4D57-8572-AF728A5C66EF}" sibTransId="{A99D1654-F0DC-4688-97D3-151E5095B5D3}"/>
+    <dgm:cxn modelId="{0B98E1E4-0422-4297-AAAC-1FC027DBA909}" srcId="{39FFD4AA-A124-4F27-B855-D59A00435B15}" destId="{A48E0A29-AACD-43F9-A7EA-032F8E2F94BB}" srcOrd="3" destOrd="0" parTransId="{F06F0734-EA2D-42A5-9037-B2FB6C9032A1}" sibTransId="{0066505A-86B3-4398-97B7-8C08BBCF514A}"/>
+    <dgm:cxn modelId="{86F8E089-8A10-4F6D-9EBB-73EDC36A57DF}" type="presOf" srcId="{1C378682-3B14-4C41-8B7D-B4CDDC6D5C7B}" destId="{D4B29442-F43F-44A1-9E2E-9C2FE1F6E2D4}" srcOrd="0" destOrd="0" presId="urn:microsoft.com/office/officeart/2005/8/layout/hierarchy2"/>
     <dgm:cxn modelId="{182D7889-A65C-4BAB-8D51-5BB9E795717D}" srcId="{A48E0A29-AACD-43F9-A7EA-032F8E2F94BB}" destId="{38EA737A-98D0-4A06-92E9-4E2F197B4A27}" srcOrd="0" destOrd="0" parTransId="{1C378682-3B14-4C41-8B7D-B4CDDC6D5C7B}" sibTransId="{7337B31E-7AAC-4418-9711-69F92B532485}"/>
-    <dgm:cxn modelId="{D1D719B4-CEE0-4AAA-8794-067783427AAB}" type="presOf" srcId="{5AB33E62-4DC7-4EE4-ACEC-3BFE7590494A}" destId="{3DA81BC4-75BC-42C3-A2A0-580D81FEA2E0}" srcOrd="1" destOrd="0" presId="urn:microsoft.com/office/officeart/2005/8/layout/hierarchy2"/>
+    <dgm:cxn modelId="{8204C710-12B8-4BD5-8291-55D79E7104DE}" srcId="{B689D8DE-CF09-4329-8EBE-BF34D0405F5F}" destId="{39FFD4AA-A124-4F27-B855-D59A00435B15}" srcOrd="1" destOrd="0" parTransId="{406F47FE-6D42-47C7-9208-5941F9A7D7CB}" sibTransId="{858B088B-F8C7-4042-8705-0C1B614D9B63}"/>
+    <dgm:cxn modelId="{EDAE94EA-A96C-463F-BB6C-0AD214560885}" type="presOf" srcId="{3102626F-7CFB-4EDF-B9BC-3544295C845F}" destId="{25E9BE56-299E-4C35-AEFA-CD5617E93DF6}" srcOrd="0" destOrd="0" presId="urn:microsoft.com/office/officeart/2005/8/layout/hierarchy2"/>
+    <dgm:cxn modelId="{B5C30AA8-314B-429E-A470-DB0D9D6D4AC1}" type="presOf" srcId="{DAEDCB7F-A52A-42E9-9C0B-3114E7DA4E56}" destId="{5F10F69B-43CA-400A-B9D9-2F06FEA6306F}" srcOrd="1" destOrd="0" presId="urn:microsoft.com/office/officeart/2005/8/layout/hierarchy2"/>
+    <dgm:cxn modelId="{295EF73A-E407-4D67-82B7-E9A729D302FA}" type="presOf" srcId="{C626744A-EE97-4D7D-9EE4-2B04E78ACB8B}" destId="{60869B68-1ED3-46EB-BC75-6C54E3547ABD}" srcOrd="0" destOrd="0" presId="urn:microsoft.com/office/officeart/2005/8/layout/hierarchy2"/>
+    <dgm:cxn modelId="{5A669493-A24F-4DE1-991E-204EDEF810EF}" type="presOf" srcId="{3D6C26A9-3065-4280-8ED7-AB848B9E0B23}" destId="{DD602D3B-1876-4E99-AC87-AFF15016E71F}" srcOrd="0" destOrd="0" presId="urn:microsoft.com/office/officeart/2005/8/layout/hierarchy2"/>
+    <dgm:cxn modelId="{8A446667-C6E2-448C-8244-101740C42160}" srcId="{4D49AF40-7CEB-4DA8-AEA1-BC6F7D40A0D6}" destId="{49A3DDC4-425C-4C8C-B6BA-2B6701C6A12A}" srcOrd="0" destOrd="0" parTransId="{5AB33E62-4DC7-4EE4-ACEC-3BFE7590494A}" sibTransId="{DE10A5AD-DFE0-4086-B279-F96D09E511EC}"/>
+    <dgm:cxn modelId="{56896155-91E2-4F54-9A8A-A19FFFB313E8}" srcId="{44A9223B-89A7-4A98-B164-DFDDE69E3BA9}" destId="{B689D8DE-CF09-4329-8EBE-BF34D0405F5F}" srcOrd="0" destOrd="0" parTransId="{991F9394-D37E-4159-B76F-331764A259CE}" sibTransId="{3FF43506-2D16-40C6-A4C8-ED44DAE7BC5E}"/>
+    <dgm:cxn modelId="{9A006890-90F5-4A80-ACA7-12AFC97E7139}" type="presOf" srcId="{079FB288-78D8-4AE3-B7E2-74F80CAE5892}" destId="{FD452309-8A1F-414B-90A7-6D1366D9E53A}" srcOrd="0" destOrd="0" presId="urn:microsoft.com/office/officeart/2005/8/layout/hierarchy2"/>
+    <dgm:cxn modelId="{3DC599F5-1FCC-4206-93B9-4869391AE7ED}" type="presOf" srcId="{3DDEAF9B-F2F1-46F9-AD22-255C8010CC7C}" destId="{588AF801-A97E-42CB-9622-8A5A085CC75A}" srcOrd="1" destOrd="0" presId="urn:microsoft.com/office/officeart/2005/8/layout/hierarchy2"/>
+    <dgm:cxn modelId="{C8A1885E-AC9F-48A3-9D34-FAC8A5A87DEB}" type="presOf" srcId="{49A3DDC4-425C-4C8C-B6BA-2B6701C6A12A}" destId="{22F1F4FB-7A19-46EF-A547-E849282E849E}" srcOrd="0" destOrd="0" presId="urn:microsoft.com/office/officeart/2005/8/layout/hierarchy2"/>
+    <dgm:cxn modelId="{2FB27BBA-E56F-4140-9740-074D80907576}" type="presOf" srcId="{A48E0A29-AACD-43F9-A7EA-032F8E2F94BB}" destId="{D2C72BA1-3DDE-4AB7-917B-32F319C3DC3D}" srcOrd="0" destOrd="0" presId="urn:microsoft.com/office/officeart/2005/8/layout/hierarchy2"/>
+    <dgm:cxn modelId="{F920B45C-8901-4726-8031-3DD43F6873EE}" srcId="{B3EEDF9C-184B-4C70-905F-CA7AFA3EF5B9}" destId="{6459FBB0-DA41-463E-9179-CD4166007C1F}" srcOrd="0" destOrd="0" parTransId="{181FBD91-68AB-4835-AF62-EC015CE61350}" sibTransId="{2B44CE1F-ECA1-417B-8FAD-B4672EA7C4FF}"/>
+    <dgm:cxn modelId="{C2F2E783-4900-4154-A022-116FCE409F1F}" type="presOf" srcId="{F06F0734-EA2D-42A5-9037-B2FB6C9032A1}" destId="{82CF57A2-9BFF-4BDC-9FEC-9095EC86E437}" srcOrd="0" destOrd="0" presId="urn:microsoft.com/office/officeart/2005/8/layout/hierarchy2"/>
+    <dgm:cxn modelId="{23C7C813-C3E8-4484-8D15-D2ADCFDE187E}" type="presOf" srcId="{58931785-D1A7-4057-B221-AA6259087750}" destId="{7BF375AB-F70B-4829-89ED-58BA5B4C3501}" srcOrd="0" destOrd="0" presId="urn:microsoft.com/office/officeart/2005/8/layout/hierarchy2"/>
+    <dgm:cxn modelId="{121D5D41-FED9-4873-89BC-E9E262428E88}" srcId="{C626744A-EE97-4D7D-9EE4-2B04E78ACB8B}" destId="{CD85F115-329C-4746-B6CD-13E39E59A4C2}" srcOrd="0" destOrd="0" parTransId="{3DDEAF9B-F2F1-46F9-AD22-255C8010CC7C}" sibTransId="{EB8E70AA-333E-41FE-9CF0-EAC10D519AB5}"/>
+    <dgm:cxn modelId="{629D6202-462E-4F94-B8A7-39CB8AC70D98}" type="presOf" srcId="{F06F0734-EA2D-42A5-9037-B2FB6C9032A1}" destId="{29A444ED-9636-46B6-BE7A-885104B9822F}" srcOrd="1" destOrd="0" presId="urn:microsoft.com/office/officeart/2005/8/layout/hierarchy2"/>
+    <dgm:cxn modelId="{B217B614-2962-475A-8F5A-A0F04A579BE5}" type="presOf" srcId="{CD85F115-329C-4746-B6CD-13E39E59A4C2}" destId="{E7395C0D-6957-446C-9E91-1E365C003190}" srcOrd="0" destOrd="0" presId="urn:microsoft.com/office/officeart/2005/8/layout/hierarchy2"/>
+    <dgm:cxn modelId="{D4A89F91-B2C8-4B85-9EE9-E6446FE43725}" type="presOf" srcId="{181FBD91-68AB-4835-AF62-EC015CE61350}" destId="{CC2A4DA4-04AD-48CA-BB26-A639867E3BA2}" srcOrd="0" destOrd="0" presId="urn:microsoft.com/office/officeart/2005/8/layout/hierarchy2"/>
+    <dgm:cxn modelId="{A72E61C0-12F3-42D8-9FE7-2F82B2CC21A2}" srcId="{545403BC-40C6-43B0-BA68-1E1FCD40083D}" destId="{139C7D14-DA09-4850-8072-C0DB9081523C}" srcOrd="0" destOrd="0" parTransId="{3102626F-7CFB-4EDF-B9BC-3544295C845F}" sibTransId="{1748AEF1-307C-45B0-8488-3206FFD287AD}"/>
+    <dgm:cxn modelId="{B830AD7F-CBCD-4BA3-8462-E44BBA5EFA64}" type="presOf" srcId="{CB42C237-1260-4D57-8572-AF728A5C66EF}" destId="{58376671-7255-4483-9840-83B030C00160}" srcOrd="0" destOrd="0" presId="urn:microsoft.com/office/officeart/2005/8/layout/hierarchy2"/>
     <dgm:cxn modelId="{CF3239E4-227C-4129-8554-D46E5A5D4A98}" type="presOf" srcId="{44A9223B-89A7-4A98-B164-DFDDE69E3BA9}" destId="{C5B08121-E880-48EB-8A17-5153378F6BCE}" srcOrd="0" destOrd="0" presId="urn:microsoft.com/office/officeart/2005/8/layout/hierarchy2"/>
-    <dgm:cxn modelId="{7573B1F3-B2DF-4988-917C-29A6E7F52F5E}" type="presOf" srcId="{38EA737A-98D0-4A06-92E9-4E2F197B4A27}" destId="{60B7AE8D-6EEE-44D0-8C21-787636E412BD}" srcOrd="0" destOrd="0" presId="urn:microsoft.com/office/officeart/2005/8/layout/hierarchy2"/>
-    <dgm:cxn modelId="{5A669493-A24F-4DE1-991E-204EDEF810EF}" type="presOf" srcId="{3D6C26A9-3065-4280-8ED7-AB848B9E0B23}" destId="{DD602D3B-1876-4E99-AC87-AFF15016E71F}" srcOrd="0" destOrd="0" presId="urn:microsoft.com/office/officeart/2005/8/layout/hierarchy2"/>
-    <dgm:cxn modelId="{15752F31-4807-4FC1-8DCB-9A8418E75074}" type="presOf" srcId="{B689D8DE-CF09-4329-8EBE-BF34D0405F5F}" destId="{6DB80201-E08E-40B4-A369-BC7B776E9EF6}" srcOrd="0" destOrd="0" presId="urn:microsoft.com/office/officeart/2005/8/layout/hierarchy2"/>
-    <dgm:cxn modelId="{0C06D765-30D5-4F0E-98DB-B19376CAC0FA}" type="presOf" srcId="{C64AC093-9DEB-487F-AB77-62B26E09591F}" destId="{2E900CF8-9339-44A3-8BB3-49EE157DFD36}" srcOrd="0" destOrd="0" presId="urn:microsoft.com/office/officeart/2005/8/layout/hierarchy2"/>
-    <dgm:cxn modelId="{23C7C813-C3E8-4484-8D15-D2ADCFDE187E}" type="presOf" srcId="{58931785-D1A7-4057-B221-AA6259087750}" destId="{7BF375AB-F70B-4829-89ED-58BA5B4C3501}" srcOrd="0" destOrd="0" presId="urn:microsoft.com/office/officeart/2005/8/layout/hierarchy2"/>
-    <dgm:cxn modelId="{C8A1885E-AC9F-48A3-9D34-FAC8A5A87DEB}" type="presOf" srcId="{49A3DDC4-425C-4C8C-B6BA-2B6701C6A12A}" destId="{22F1F4FB-7A19-46EF-A547-E849282E849E}" srcOrd="0" destOrd="0" presId="urn:microsoft.com/office/officeart/2005/8/layout/hierarchy2"/>
-    <dgm:cxn modelId="{A72E61C0-12F3-42D8-9FE7-2F82B2CC21A2}" srcId="{545403BC-40C6-43B0-BA68-1E1FCD40083D}" destId="{139C7D14-DA09-4850-8072-C0DB9081523C}" srcOrd="0" destOrd="0" parTransId="{3102626F-7CFB-4EDF-B9BC-3544295C845F}" sibTransId="{1748AEF1-307C-45B0-8488-3206FFD287AD}"/>
-    <dgm:cxn modelId="{F85939C7-B67E-47BB-BB0E-B52C42E50930}" type="presOf" srcId="{14BA256F-ABA9-49B2-A12F-ED2CCE5D97B9}" destId="{52F7C414-CE7D-4E24-891D-A5D889BDA974}" srcOrd="0" destOrd="0" presId="urn:microsoft.com/office/officeart/2005/8/layout/hierarchy2"/>
-    <dgm:cxn modelId="{B830AD7F-CBCD-4BA3-8462-E44BBA5EFA64}" type="presOf" srcId="{CB42C237-1260-4D57-8572-AF728A5C66EF}" destId="{58376671-7255-4483-9840-83B030C00160}" srcOrd="0" destOrd="0" presId="urn:microsoft.com/office/officeart/2005/8/layout/hierarchy2"/>
-    <dgm:cxn modelId="{D39F7632-A6D4-41C0-BF56-F34E0B40F6FE}" type="presOf" srcId="{5AB33E62-4DC7-4EE4-ACEC-3BFE7590494A}" destId="{FC72337D-7B3E-46A6-81E9-4D4876D10BDB}" srcOrd="0" destOrd="0" presId="urn:microsoft.com/office/officeart/2005/8/layout/hierarchy2"/>
     <dgm:cxn modelId="{8FBA8B6C-6197-47D0-B4E3-9691AC0C6A9F}" type="presOf" srcId="{B3EEDF9C-184B-4C70-905F-CA7AFA3EF5B9}" destId="{575D1F8C-5B1D-41CE-99DB-693659514D2B}" srcOrd="0" destOrd="0" presId="urn:microsoft.com/office/officeart/2005/8/layout/hierarchy2"/>
     <dgm:cxn modelId="{0D21F909-57F2-4DC1-9A50-7FCA715BBD42}" srcId="{39FFD4AA-A124-4F27-B855-D59A00435B15}" destId="{545403BC-40C6-43B0-BA68-1E1FCD40083D}" srcOrd="0" destOrd="0" parTransId="{DAEDCB7F-A52A-42E9-9C0B-3114E7DA4E56}" sibTransId="{B79EABB7-1672-44BC-9D1B-D7DA1533F1C0}"/>
-    <dgm:cxn modelId="{C2F2E783-4900-4154-A022-116FCE409F1F}" type="presOf" srcId="{F06F0734-EA2D-42A5-9037-B2FB6C9032A1}" destId="{82CF57A2-9BFF-4BDC-9FEC-9095EC86E437}" srcOrd="0" destOrd="0" presId="urn:microsoft.com/office/officeart/2005/8/layout/hierarchy2"/>
-    <dgm:cxn modelId="{DA58D6A8-BCE9-4E46-8643-2A520AE48FA4}" srcId="{079FB288-78D8-4AE3-B7E2-74F80CAE5892}" destId="{14BA256F-ABA9-49B2-A12F-ED2CCE5D97B9}" srcOrd="0" destOrd="0" parTransId="{CB42C237-1260-4D57-8572-AF728A5C66EF}" sibTransId="{A99D1654-F0DC-4688-97D3-151E5095B5D3}"/>
     <dgm:cxn modelId="{35910851-1045-4BD9-94B4-52CEDADFDFD4}" type="presOf" srcId="{406F47FE-6D42-47C7-9208-5941F9A7D7CB}" destId="{E7A2173C-108E-4780-B19F-52A5A93CE599}" srcOrd="1" destOrd="0" presId="urn:microsoft.com/office/officeart/2005/8/layout/hierarchy2"/>
+    <dgm:cxn modelId="{0C4050ED-D9B1-4E05-B096-86A8A87C8635}" type="presOf" srcId="{139C7D14-DA09-4850-8072-C0DB9081523C}" destId="{491CCBE5-49DF-4375-B178-811F45C23044}" srcOrd="0" destOrd="0" presId="urn:microsoft.com/office/officeart/2005/8/layout/hierarchy2"/>
+    <dgm:cxn modelId="{244E5FF2-6B51-4C3F-8877-187108B2B665}" type="presOf" srcId="{545403BC-40C6-43B0-BA68-1E1FCD40083D}" destId="{8557AE4D-D2B7-4A53-AA87-E3C6C8022E4D}" srcOrd="0" destOrd="0" presId="urn:microsoft.com/office/officeart/2005/8/layout/hierarchy2"/>
+    <dgm:cxn modelId="{15752F31-4807-4FC1-8DCB-9A8418E75074}" type="presOf" srcId="{B689D8DE-CF09-4329-8EBE-BF34D0405F5F}" destId="{6DB80201-E08E-40B4-A369-BC7B776E9EF6}" srcOrd="0" destOrd="0" presId="urn:microsoft.com/office/officeart/2005/8/layout/hierarchy2"/>
+    <dgm:cxn modelId="{84AEFEC0-415E-410B-88F0-2D1B4B34130D}" srcId="{B689D8DE-CF09-4329-8EBE-BF34D0405F5F}" destId="{079FB288-78D8-4AE3-B7E2-74F80CAE5892}" srcOrd="0" destOrd="0" parTransId="{3D6C26A9-3065-4280-8ED7-AB848B9E0B23}" sibTransId="{D8EE8C6B-1CA1-446C-8FFA-70493AAC9F40}"/>
+    <dgm:cxn modelId="{90ABBD7F-535A-451B-80E4-28E0A02D6D6A}" type="presOf" srcId="{4D49AF40-7CEB-4DA8-AEA1-BC6F7D40A0D6}" destId="{617451F6-02F5-4B5F-9C82-217A464ED8C7}" srcOrd="0" destOrd="0" presId="urn:microsoft.com/office/officeart/2005/8/layout/hierarchy2"/>
+    <dgm:cxn modelId="{89D1339E-79BE-4A1B-8228-FC0322CFDF7E}" type="presOf" srcId="{6459FBB0-DA41-463E-9179-CD4166007C1F}" destId="{14483275-D448-415B-8470-2358E1DC79D7}" srcOrd="0" destOrd="0" presId="urn:microsoft.com/office/officeart/2005/8/layout/hierarchy2"/>
+    <dgm:cxn modelId="{78ED5BE6-27CB-4965-BB5D-74F25C8865F3}" type="presOf" srcId="{3DDEAF9B-F2F1-46F9-AD22-255C8010CC7C}" destId="{E56F25DF-E7F6-42A2-9C4A-9E0CD9C0ADAE}" srcOrd="0" destOrd="0" presId="urn:microsoft.com/office/officeart/2005/8/layout/hierarchy2"/>
     <dgm:cxn modelId="{0BE768B1-C33B-4B9D-A6D7-AB46719CAA0A}" srcId="{39FFD4AA-A124-4F27-B855-D59A00435B15}" destId="{4D49AF40-7CEB-4DA8-AEA1-BC6F7D40A0D6}" srcOrd="1" destOrd="0" parTransId="{58931785-D1A7-4057-B221-AA6259087750}" sibTransId="{6A036B06-2898-447E-908A-2700E9D8EFE8}"/>
-    <dgm:cxn modelId="{8A446667-C6E2-448C-8244-101740C42160}" srcId="{4D49AF40-7CEB-4DA8-AEA1-BC6F7D40A0D6}" destId="{49A3DDC4-425C-4C8C-B6BA-2B6701C6A12A}" srcOrd="0" destOrd="0" parTransId="{5AB33E62-4DC7-4EE4-ACEC-3BFE7590494A}" sibTransId="{DE10A5AD-DFE0-4086-B279-F96D09E511EC}"/>
-    <dgm:cxn modelId="{B5C30AA8-314B-429E-A470-DB0D9D6D4AC1}" type="presOf" srcId="{DAEDCB7F-A52A-42E9-9C0B-3114E7DA4E56}" destId="{5F10F69B-43CA-400A-B9D9-2F06FEA6306F}" srcOrd="1" destOrd="0" presId="urn:microsoft.com/office/officeart/2005/8/layout/hierarchy2"/>
-    <dgm:cxn modelId="{86F8E089-8A10-4F6D-9EBB-73EDC36A57DF}" type="presOf" srcId="{1C378682-3B14-4C41-8B7D-B4CDDC6D5C7B}" destId="{D4B29442-F43F-44A1-9E2E-9C2FE1F6E2D4}" srcOrd="0" destOrd="0" presId="urn:microsoft.com/office/officeart/2005/8/layout/hierarchy2"/>
-    <dgm:cxn modelId="{2FB27BBA-E56F-4140-9740-074D80907576}" type="presOf" srcId="{A48E0A29-AACD-43F9-A7EA-032F8E2F94BB}" destId="{D2C72BA1-3DDE-4AB7-917B-32F319C3DC3D}" srcOrd="0" destOrd="0" presId="urn:microsoft.com/office/officeart/2005/8/layout/hierarchy2"/>
-    <dgm:cxn modelId="{EB8FFCB4-FAAF-4FAC-941A-8AB4B313857F}" type="presOf" srcId="{1C378682-3B14-4C41-8B7D-B4CDDC6D5C7B}" destId="{2771A3B0-FD1B-43E0-826E-9E67F9A5A78B}" srcOrd="1" destOrd="0" presId="urn:microsoft.com/office/officeart/2005/8/layout/hierarchy2"/>
-    <dgm:cxn modelId="{D4A89F91-B2C8-4B85-9EE9-E6446FE43725}" type="presOf" srcId="{181FBD91-68AB-4835-AF62-EC015CE61350}" destId="{CC2A4DA4-04AD-48CA-BB26-A639867E3BA2}" srcOrd="0" destOrd="0" presId="urn:microsoft.com/office/officeart/2005/8/layout/hierarchy2"/>
+    <dgm:cxn modelId="{CDB15822-03E7-444A-AFDA-2AEB478E93E0}" type="presOf" srcId="{58931785-D1A7-4057-B221-AA6259087750}" destId="{BFA54812-EE2D-4A6A-8445-5AD1A12E0CAC}" srcOrd="1" destOrd="0" presId="urn:microsoft.com/office/officeart/2005/8/layout/hierarchy2"/>
+    <dgm:cxn modelId="{A2360700-BAD4-451A-9D69-E697D283DD02}" type="presOf" srcId="{CB42C237-1260-4D57-8572-AF728A5C66EF}" destId="{696BF2F7-BB6E-454F-BCD5-8E394FF656F1}" srcOrd="1" destOrd="0" presId="urn:microsoft.com/office/officeart/2005/8/layout/hierarchy2"/>
     <dgm:cxn modelId="{0AD6B6EF-5812-484E-B1A7-FA8FBBB6AA0B}" type="presOf" srcId="{0367407A-B331-43A8-A835-52C1CC071464}" destId="{D5DA7A14-F1CF-444D-B648-7C1C7973D432}" srcOrd="0" destOrd="0" presId="urn:microsoft.com/office/officeart/2005/8/layout/hierarchy2"/>
-    <dgm:cxn modelId="{D753ABBB-DC91-4259-87AE-97752901AE68}" srcId="{B689D8DE-CF09-4329-8EBE-BF34D0405F5F}" destId="{C626744A-EE97-4D7D-9EE4-2B04E78ACB8B}" srcOrd="2" destOrd="0" parTransId="{C64AC093-9DEB-487F-AB77-62B26E09591F}" sibTransId="{A5B95C08-6F31-4AB8-8398-64F3D2FDAF14}"/>
-    <dgm:cxn modelId="{0C4050ED-D9B1-4E05-B096-86A8A87C8635}" type="presOf" srcId="{139C7D14-DA09-4850-8072-C0DB9081523C}" destId="{491CCBE5-49DF-4375-B178-811F45C23044}" srcOrd="0" destOrd="0" presId="urn:microsoft.com/office/officeart/2005/8/layout/hierarchy2"/>
+    <dgm:cxn modelId="{CA0501B8-A2B4-4C6D-A7CA-5C5F9D41D8CC}" type="presOf" srcId="{39FFD4AA-A124-4F27-B855-D59A00435B15}" destId="{FF503304-CCE6-4A1C-990C-5578FA7DBE2F}" srcOrd="0" destOrd="0" presId="urn:microsoft.com/office/officeart/2005/8/layout/hierarchy2"/>
+    <dgm:cxn modelId="{7573B1F3-B2DF-4988-917C-29A6E7F52F5E}" type="presOf" srcId="{38EA737A-98D0-4A06-92E9-4E2F197B4A27}" destId="{60B7AE8D-6EEE-44D0-8C21-787636E412BD}" srcOrd="0" destOrd="0" presId="urn:microsoft.com/office/officeart/2005/8/layout/hierarchy2"/>
+    <dgm:cxn modelId="{D39F7632-A6D4-41C0-BF56-F34E0B40F6FE}" type="presOf" srcId="{5AB33E62-4DC7-4EE4-ACEC-3BFE7590494A}" destId="{FC72337D-7B3E-46A6-81E9-4D4876D10BDB}" srcOrd="0" destOrd="0" presId="urn:microsoft.com/office/officeart/2005/8/layout/hierarchy2"/>
+    <dgm:cxn modelId="{0C06D765-30D5-4F0E-98DB-B19376CAC0FA}" type="presOf" srcId="{C64AC093-9DEB-487F-AB77-62B26E09591F}" destId="{2E900CF8-9339-44A3-8BB3-49EE157DFD36}" srcOrd="0" destOrd="0" presId="urn:microsoft.com/office/officeart/2005/8/layout/hierarchy2"/>
+    <dgm:cxn modelId="{FE961932-C8D9-4BA7-A7E0-0B0F788ADC14}" type="presOf" srcId="{406F47FE-6D42-47C7-9208-5941F9A7D7CB}" destId="{28A91AF3-F4DA-46D9-A6C2-E9981AE15014}" srcOrd="0" destOrd="0" presId="urn:microsoft.com/office/officeart/2005/8/layout/hierarchy2"/>
     <dgm:cxn modelId="{95571469-6577-4319-903D-B4B776A78211}" type="presOf" srcId="{3D6C26A9-3065-4280-8ED7-AB848B9E0B23}" destId="{9DB3BA37-0700-4C02-A5B9-95D3D409F065}" srcOrd="1" destOrd="0" presId="urn:microsoft.com/office/officeart/2005/8/layout/hierarchy2"/>
-    <dgm:cxn modelId="{CA0501B8-A2B4-4C6D-A7CA-5C5F9D41D8CC}" type="presOf" srcId="{39FFD4AA-A124-4F27-B855-D59A00435B15}" destId="{FF503304-CCE6-4A1C-990C-5578FA7DBE2F}" srcOrd="0" destOrd="0" presId="urn:microsoft.com/office/officeart/2005/8/layout/hierarchy2"/>
-    <dgm:cxn modelId="{78ED5BE6-27CB-4965-BB5D-74F25C8865F3}" type="presOf" srcId="{3DDEAF9B-F2F1-46F9-AD22-255C8010CC7C}" destId="{E56F25DF-E7F6-42A2-9C4A-9E0CD9C0ADAE}" srcOrd="0" destOrd="0" presId="urn:microsoft.com/office/officeart/2005/8/layout/hierarchy2"/>
-    <dgm:cxn modelId="{89D1339E-79BE-4A1B-8228-FC0322CFDF7E}" type="presOf" srcId="{6459FBB0-DA41-463E-9179-CD4166007C1F}" destId="{14483275-D448-415B-8470-2358E1DC79D7}" srcOrd="0" destOrd="0" presId="urn:microsoft.com/office/officeart/2005/8/layout/hierarchy2"/>
-    <dgm:cxn modelId="{8204C710-12B8-4BD5-8291-55D79E7104DE}" srcId="{B689D8DE-CF09-4329-8EBE-BF34D0405F5F}" destId="{39FFD4AA-A124-4F27-B855-D59A00435B15}" srcOrd="1" destOrd="0" parTransId="{406F47FE-6D42-47C7-9208-5941F9A7D7CB}" sibTransId="{858B088B-F8C7-4042-8705-0C1B614D9B63}"/>
-    <dgm:cxn modelId="{A2360700-BAD4-451A-9D69-E697D283DD02}" type="presOf" srcId="{CB42C237-1260-4D57-8572-AF728A5C66EF}" destId="{696BF2F7-BB6E-454F-BCD5-8E394FF656F1}" srcOrd="1" destOrd="0" presId="urn:microsoft.com/office/officeart/2005/8/layout/hierarchy2"/>
-    <dgm:cxn modelId="{EADCEE26-ACDC-48C5-8569-F2630DCC5ADD}" type="presOf" srcId="{DAEDCB7F-A52A-42E9-9C0B-3114E7DA4E56}" destId="{447F65B9-1F2A-4FBB-ACD1-ABFC2FCF7F43}" srcOrd="0" destOrd="0" presId="urn:microsoft.com/office/officeart/2005/8/layout/hierarchy2"/>
-    <dgm:cxn modelId="{90ABBD7F-535A-451B-80E4-28E0A02D6D6A}" type="presOf" srcId="{4D49AF40-7CEB-4DA8-AEA1-BC6F7D40A0D6}" destId="{617451F6-02F5-4B5F-9C82-217A464ED8C7}" srcOrd="0" destOrd="0" presId="urn:microsoft.com/office/officeart/2005/8/layout/hierarchy2"/>
-    <dgm:cxn modelId="{629D6202-462E-4F94-B8A7-39CB8AC70D98}" type="presOf" srcId="{F06F0734-EA2D-42A5-9037-B2FB6C9032A1}" destId="{29A444ED-9636-46B6-BE7A-885104B9822F}" srcOrd="1" destOrd="0" presId="urn:microsoft.com/office/officeart/2005/8/layout/hierarchy2"/>
-    <dgm:cxn modelId="{FAEFDCBF-4610-489F-9F53-C49868714BD1}" type="presOf" srcId="{181FBD91-68AB-4835-AF62-EC015CE61350}" destId="{B864B941-214B-43C6-9FDD-BA89E3CBDA31}" srcOrd="1" destOrd="0" presId="urn:microsoft.com/office/officeart/2005/8/layout/hierarchy2"/>
-    <dgm:cxn modelId="{6CCA184D-C094-4ABC-A57D-0A327D6018EE}" type="presOf" srcId="{C64AC093-9DEB-487F-AB77-62B26E09591F}" destId="{5033B1DF-BE2C-413E-A6CD-E2F5A0863159}" srcOrd="1" destOrd="0" presId="urn:microsoft.com/office/officeart/2005/8/layout/hierarchy2"/>
-    <dgm:cxn modelId="{EDAE94EA-A96C-463F-BB6C-0AD214560885}" type="presOf" srcId="{3102626F-7CFB-4EDF-B9BC-3544295C845F}" destId="{25E9BE56-299E-4C35-AEFA-CD5617E93DF6}" srcOrd="0" destOrd="0" presId="urn:microsoft.com/office/officeart/2005/8/layout/hierarchy2"/>
-    <dgm:cxn modelId="{0B98E1E4-0422-4297-AAAC-1FC027DBA909}" srcId="{39FFD4AA-A124-4F27-B855-D59A00435B15}" destId="{A48E0A29-AACD-43F9-A7EA-032F8E2F94BB}" srcOrd="3" destOrd="0" parTransId="{F06F0734-EA2D-42A5-9037-B2FB6C9032A1}" sibTransId="{0066505A-86B3-4398-97B7-8C08BBCF514A}"/>
-    <dgm:cxn modelId="{9A006890-90F5-4A80-ACA7-12AFC97E7139}" type="presOf" srcId="{079FB288-78D8-4AE3-B7E2-74F80CAE5892}" destId="{FD452309-8A1F-414B-90A7-6D1366D9E53A}" srcOrd="0" destOrd="0" presId="urn:microsoft.com/office/officeart/2005/8/layout/hierarchy2"/>
-    <dgm:cxn modelId="{244E5FF2-6B51-4C3F-8877-187108B2B665}" type="presOf" srcId="{545403BC-40C6-43B0-BA68-1E1FCD40083D}" destId="{8557AE4D-D2B7-4A53-AA87-E3C6C8022E4D}" srcOrd="0" destOrd="0" presId="urn:microsoft.com/office/officeart/2005/8/layout/hierarchy2"/>
-    <dgm:cxn modelId="{F920B45C-8901-4726-8031-3DD43F6873EE}" srcId="{B3EEDF9C-184B-4C70-905F-CA7AFA3EF5B9}" destId="{6459FBB0-DA41-463E-9179-CD4166007C1F}" srcOrd="0" destOrd="0" parTransId="{181FBD91-68AB-4835-AF62-EC015CE61350}" sibTransId="{2B44CE1F-ECA1-417B-8FAD-B4672EA7C4FF}"/>
-    <dgm:cxn modelId="{84AEFEC0-415E-410B-88F0-2D1B4B34130D}" srcId="{B689D8DE-CF09-4329-8EBE-BF34D0405F5F}" destId="{079FB288-78D8-4AE3-B7E2-74F80CAE5892}" srcOrd="0" destOrd="0" parTransId="{3D6C26A9-3065-4280-8ED7-AB848B9E0B23}" sibTransId="{D8EE8C6B-1CA1-446C-8FFA-70493AAC9F40}"/>
-    <dgm:cxn modelId="{CDB15822-03E7-444A-AFDA-2AEB478E93E0}" type="presOf" srcId="{58931785-D1A7-4057-B221-AA6259087750}" destId="{BFA54812-EE2D-4A6A-8445-5AD1A12E0CAC}" srcOrd="1" destOrd="0" presId="urn:microsoft.com/office/officeart/2005/8/layout/hierarchy2"/>
-    <dgm:cxn modelId="{51A8D6DE-ED35-496F-8E86-62CB8E33A5CD}" type="presOf" srcId="{0367407A-B331-43A8-A835-52C1CC071464}" destId="{33AEF5F6-F501-4F99-815C-81CA3194CE5D}" srcOrd="1" destOrd="0" presId="urn:microsoft.com/office/officeart/2005/8/layout/hierarchy2"/>
-    <dgm:cxn modelId="{3DC599F5-1FCC-4206-93B9-4869391AE7ED}" type="presOf" srcId="{3DDEAF9B-F2F1-46F9-AD22-255C8010CC7C}" destId="{588AF801-A97E-42CB-9622-8A5A085CC75A}" srcOrd="1" destOrd="0" presId="urn:microsoft.com/office/officeart/2005/8/layout/hierarchy2"/>
-    <dgm:cxn modelId="{121D5D41-FED9-4873-89BC-E9E262428E88}" srcId="{C626744A-EE97-4D7D-9EE4-2B04E78ACB8B}" destId="{CD85F115-329C-4746-B6CD-13E39E59A4C2}" srcOrd="0" destOrd="0" parTransId="{3DDEAF9B-F2F1-46F9-AD22-255C8010CC7C}" sibTransId="{EB8E70AA-333E-41FE-9CF0-EAC10D519AB5}"/>
-    <dgm:cxn modelId="{56896155-91E2-4F54-9A8A-A19FFFB313E8}" srcId="{44A9223B-89A7-4A98-B164-DFDDE69E3BA9}" destId="{B689D8DE-CF09-4329-8EBE-BF34D0405F5F}" srcOrd="0" destOrd="0" parTransId="{991F9394-D37E-4159-B76F-331764A259CE}" sibTransId="{3FF43506-2D16-40C6-A4C8-ED44DAE7BC5E}"/>
-    <dgm:cxn modelId="{B217B614-2962-475A-8F5A-A0F04A579BE5}" type="presOf" srcId="{CD85F115-329C-4746-B6CD-13E39E59A4C2}" destId="{E7395C0D-6957-446C-9E91-1E365C003190}" srcOrd="0" destOrd="0" presId="urn:microsoft.com/office/officeart/2005/8/layout/hierarchy2"/>
-    <dgm:cxn modelId="{08A5BC99-49D8-4B5B-AFD1-7E2B6BE57A21}" srcId="{39FFD4AA-A124-4F27-B855-D59A00435B15}" destId="{B3EEDF9C-184B-4C70-905F-CA7AFA3EF5B9}" srcOrd="2" destOrd="0" parTransId="{0367407A-B331-43A8-A835-52C1CC071464}" sibTransId="{F3B8693A-B9C7-458A-920F-76A59FF35554}"/>
-    <dgm:cxn modelId="{FE961932-C8D9-4BA7-A7E0-0B0F788ADC14}" type="presOf" srcId="{406F47FE-6D42-47C7-9208-5941F9A7D7CB}" destId="{28A91AF3-F4DA-46D9-A6C2-E9981AE15014}" srcOrd="0" destOrd="0" presId="urn:microsoft.com/office/officeart/2005/8/layout/hierarchy2"/>
-    <dgm:cxn modelId="{295EF73A-E407-4D67-82B7-E9A729D302FA}" type="presOf" srcId="{C626744A-EE97-4D7D-9EE4-2B04E78ACB8B}" destId="{60869B68-1ED3-46EB-BC75-6C54E3547ABD}" srcOrd="0" destOrd="0" presId="urn:microsoft.com/office/officeart/2005/8/layout/hierarchy2"/>
-    <dgm:cxn modelId="{B5AC2237-410E-4B6E-AD5A-A9F5D576CCF5}" type="presOf" srcId="{3102626F-7CFB-4EDF-B9BC-3544295C845F}" destId="{02C0F7DE-7DEB-4728-94A8-675F08C61B61}" srcOrd="1" destOrd="0" presId="urn:microsoft.com/office/officeart/2005/8/layout/hierarchy2"/>
     <dgm:cxn modelId="{F9C5E68F-312E-4AD3-BE21-A155BAD51F03}" type="presParOf" srcId="{C5B08121-E880-48EB-8A17-5153378F6BCE}" destId="{068DAF1A-AA29-42AE-A527-16E78A18FB51}" srcOrd="0" destOrd="0" presId="urn:microsoft.com/office/officeart/2005/8/layout/hierarchy2"/>
     <dgm:cxn modelId="{85E8BE61-BAF0-45FD-9BBB-314644BC36CC}" type="presParOf" srcId="{068DAF1A-AA29-42AE-A527-16E78A18FB51}" destId="{6DB80201-E08E-40B4-A369-BC7B776E9EF6}" srcOrd="0" destOrd="0" presId="urn:microsoft.com/office/officeart/2005/8/layout/hierarchy2"/>
     <dgm:cxn modelId="{45632B81-9574-4ACB-8DD5-02A360FE17E7}" type="presParOf" srcId="{068DAF1A-AA29-42AE-A527-16E78A18FB51}" destId="{2A065C2A-11A3-46CC-90C5-815AA2B1A167}" srcOrd="1" destOrd="0" presId="urn:microsoft.com/office/officeart/2005/8/layout/hierarchy2"/>
@@ -3712,6 +3712,2178 @@
       <dsp:cNvGrpSpPr/>
     </dsp:nvGrpSpPr>
     <dsp:grpSpPr/>
+    <dsp:sp modelId="{6DB80201-E08E-40B4-A369-BC7B776E9EF6}">
+      <dsp:nvSpPr>
+        <dsp:cNvPr id="0" name=""/>
+        <dsp:cNvSpPr/>
+      </dsp:nvSpPr>
+      <dsp:spPr>
+        <a:xfrm>
+          <a:off x="0" y="1752597"/>
+          <a:ext cx="1202531" cy="601265"/>
+        </a:xfrm>
+        <a:prstGeom prst="roundRect">
+          <a:avLst>
+            <a:gd name="adj" fmla="val 10000"/>
+          </a:avLst>
+        </a:prstGeom>
+        <a:solidFill>
+          <a:schemeClr val="accent2">
+            <a:hueOff val="0"/>
+            <a:satOff val="0"/>
+            <a:lumOff val="0"/>
+            <a:alphaOff val="0"/>
+          </a:schemeClr>
+        </a:solidFill>
+        <a:ln w="55000" cap="flat" cmpd="thickThin" algn="ctr">
+          <a:solidFill>
+            <a:schemeClr val="lt1">
+              <a:hueOff val="0"/>
+              <a:satOff val="0"/>
+              <a:lumOff val="0"/>
+              <a:alphaOff val="0"/>
+            </a:schemeClr>
+          </a:solidFill>
+          <a:prstDash val="solid"/>
+        </a:ln>
+        <a:effectLst/>
+      </dsp:spPr>
+      <dsp:style>
+        <a:lnRef idx="2">
+          <a:scrgbClr r="0" g="0" b="0"/>
+        </a:lnRef>
+        <a:fillRef idx="1">
+          <a:scrgbClr r="0" g="0" b="0"/>
+        </a:fillRef>
+        <a:effectRef idx="0">
+          <a:scrgbClr r="0" g="0" b="0"/>
+        </a:effectRef>
+        <a:fontRef idx="minor">
+          <a:schemeClr val="lt1"/>
+        </a:fontRef>
+      </dsp:style>
+      <dsp:txBody>
+        <a:bodyPr spcFirstLastPara="0" vert="horz" wrap="square" lIns="9525" tIns="9525" rIns="9525" bIns="9525" numCol="1" spcCol="1270" anchor="ctr" anchorCtr="0">
+          <a:noAutofit/>
+        </a:bodyPr>
+        <a:lstStyle/>
+        <a:p>
+          <a:pPr lvl="0" algn="ctr" defTabSz="666750">
+            <a:lnSpc>
+              <a:spcPct val="90000"/>
+            </a:lnSpc>
+            <a:spcBef>
+              <a:spcPct val="0"/>
+            </a:spcBef>
+            <a:spcAft>
+              <a:spcPct val="35000"/>
+            </a:spcAft>
+          </a:pPr>
+          <a:r>
+            <a:rPr lang="en-US" sz="1500" kern="1200" dirty="0" smtClean="0"/>
+            <a:t>Operators</a:t>
+          </a:r>
+          <a:endParaRPr lang="en-US" sz="1500" kern="1200" dirty="0"/>
+        </a:p>
+      </dsp:txBody>
+      <dsp:txXfrm>
+        <a:off x="17610" y="1770207"/>
+        <a:ext cx="1167311" cy="566045"/>
+      </dsp:txXfrm>
+    </dsp:sp>
+    <dsp:sp modelId="{DD602D3B-1876-4E99-AC87-AFF15016E71F}">
+      <dsp:nvSpPr>
+        <dsp:cNvPr id="0" name=""/>
+        <dsp:cNvSpPr/>
+      </dsp:nvSpPr>
+      <dsp:spPr>
+        <a:xfrm rot="18002568">
+          <a:off x="697823" y="1164980"/>
+          <a:ext cx="2021447" cy="26630"/>
+        </a:xfrm>
+        <a:custGeom>
+          <a:avLst/>
+          <a:gdLst/>
+          <a:ahLst/>
+          <a:cxnLst/>
+          <a:rect l="0" t="0" r="0" b="0"/>
+          <a:pathLst>
+            <a:path>
+              <a:moveTo>
+                <a:pt x="0" y="13315"/>
+              </a:moveTo>
+              <a:lnTo>
+                <a:pt x="2021447" y="13315"/>
+              </a:lnTo>
+            </a:path>
+          </a:pathLst>
+        </a:custGeom>
+        <a:noFill/>
+        <a:ln w="55000" cap="flat" cmpd="thickThin" algn="ctr">
+          <a:solidFill>
+            <a:schemeClr val="accent4">
+              <a:hueOff val="0"/>
+              <a:satOff val="0"/>
+              <a:lumOff val="0"/>
+              <a:alphaOff val="0"/>
+            </a:schemeClr>
+          </a:solidFill>
+          <a:prstDash val="solid"/>
+        </a:ln>
+        <a:effectLst/>
+      </dsp:spPr>
+      <dsp:style>
+        <a:lnRef idx="2">
+          <a:scrgbClr r="0" g="0" b="0"/>
+        </a:lnRef>
+        <a:fillRef idx="0">
+          <a:scrgbClr r="0" g="0" b="0"/>
+        </a:fillRef>
+        <a:effectRef idx="0">
+          <a:scrgbClr r="0" g="0" b="0"/>
+        </a:effectRef>
+        <a:fontRef idx="minor"/>
+      </dsp:style>
+      <dsp:txBody>
+        <a:bodyPr spcFirstLastPara="0" vert="horz" wrap="square" lIns="12700" tIns="0" rIns="12700" bIns="0" numCol="1" spcCol="1270" anchor="ctr" anchorCtr="0">
+          <a:noAutofit/>
+        </a:bodyPr>
+        <a:lstStyle/>
+        <a:p>
+          <a:pPr lvl="0" algn="ctr" defTabSz="222250">
+            <a:lnSpc>
+              <a:spcPct val="90000"/>
+            </a:lnSpc>
+            <a:spcBef>
+              <a:spcPct val="0"/>
+            </a:spcBef>
+            <a:spcAft>
+              <a:spcPct val="35000"/>
+            </a:spcAft>
+          </a:pPr>
+          <a:endParaRPr lang="en-US" sz="500" kern="1200">
+            <a:solidFill>
+              <a:schemeClr val="tx1"/>
+            </a:solidFill>
+          </a:endParaRPr>
+        </a:p>
+      </dsp:txBody>
+      <dsp:txXfrm>
+        <a:off x="1658010" y="1127759"/>
+        <a:ext cx="101072" cy="101072"/>
+      </dsp:txXfrm>
+    </dsp:sp>
+    <dsp:sp modelId="{FD452309-8A1F-414B-90A7-6D1366D9E53A}">
+      <dsp:nvSpPr>
+        <dsp:cNvPr id="0" name=""/>
+        <dsp:cNvSpPr/>
+      </dsp:nvSpPr>
+      <dsp:spPr>
+        <a:xfrm>
+          <a:off x="2214562" y="2728"/>
+          <a:ext cx="1202531" cy="601265"/>
+        </a:xfrm>
+        <a:prstGeom prst="roundRect">
+          <a:avLst>
+            <a:gd name="adj" fmla="val 10000"/>
+          </a:avLst>
+        </a:prstGeom>
+        <a:solidFill>
+          <a:schemeClr val="accent4">
+            <a:hueOff val="0"/>
+            <a:satOff val="0"/>
+            <a:lumOff val="0"/>
+            <a:alphaOff val="0"/>
+          </a:schemeClr>
+        </a:solidFill>
+        <a:ln w="55000" cap="flat" cmpd="thickThin" algn="ctr">
+          <a:solidFill>
+            <a:schemeClr val="lt1">
+              <a:hueOff val="0"/>
+              <a:satOff val="0"/>
+              <a:lumOff val="0"/>
+              <a:alphaOff val="0"/>
+            </a:schemeClr>
+          </a:solidFill>
+          <a:prstDash val="solid"/>
+        </a:ln>
+        <a:effectLst/>
+      </dsp:spPr>
+      <dsp:style>
+        <a:lnRef idx="2">
+          <a:scrgbClr r="0" g="0" b="0"/>
+        </a:lnRef>
+        <a:fillRef idx="1">
+          <a:scrgbClr r="0" g="0" b="0"/>
+        </a:fillRef>
+        <a:effectRef idx="0">
+          <a:scrgbClr r="0" g="0" b="0"/>
+        </a:effectRef>
+        <a:fontRef idx="minor">
+          <a:schemeClr val="lt1"/>
+        </a:fontRef>
+      </dsp:style>
+      <dsp:txBody>
+        <a:bodyPr spcFirstLastPara="0" vert="horz" wrap="square" lIns="9525" tIns="9525" rIns="9525" bIns="9525" numCol="1" spcCol="1270" anchor="ctr" anchorCtr="0">
+          <a:noAutofit/>
+        </a:bodyPr>
+        <a:lstStyle/>
+        <a:p>
+          <a:pPr lvl="0" algn="ctr" defTabSz="666750">
+            <a:lnSpc>
+              <a:spcPct val="90000"/>
+            </a:lnSpc>
+            <a:spcBef>
+              <a:spcPct val="0"/>
+            </a:spcBef>
+            <a:spcAft>
+              <a:spcPct val="35000"/>
+            </a:spcAft>
+          </a:pPr>
+          <a:r>
+            <a:rPr lang="en-US" sz="1500" kern="1200" smtClean="0"/>
+            <a:t>Unary</a:t>
+          </a:r>
+          <a:endParaRPr lang="en-US" sz="1500" kern="1200" dirty="0"/>
+        </a:p>
+      </dsp:txBody>
+      <dsp:txXfrm>
+        <a:off x="2232172" y="20338"/>
+        <a:ext cx="1167311" cy="566045"/>
+      </dsp:txXfrm>
+    </dsp:sp>
+    <dsp:sp modelId="{58376671-7255-4483-9840-83B030C00160}">
+      <dsp:nvSpPr>
+        <dsp:cNvPr id="0" name=""/>
+        <dsp:cNvSpPr/>
+      </dsp:nvSpPr>
+      <dsp:spPr>
+        <a:xfrm>
+          <a:off x="3417093" y="290045"/>
+          <a:ext cx="481012" cy="26630"/>
+        </a:xfrm>
+        <a:custGeom>
+          <a:avLst/>
+          <a:gdLst/>
+          <a:ahLst/>
+          <a:cxnLst/>
+          <a:rect l="0" t="0" r="0" b="0"/>
+          <a:pathLst>
+            <a:path>
+              <a:moveTo>
+                <a:pt x="0" y="13315"/>
+              </a:moveTo>
+              <a:lnTo>
+                <a:pt x="481012" y="13315"/>
+              </a:lnTo>
+            </a:path>
+          </a:pathLst>
+        </a:custGeom>
+        <a:noFill/>
+        <a:ln w="55000" cap="flat" cmpd="thickThin" algn="ctr">
+          <a:solidFill>
+            <a:schemeClr val="accent5">
+              <a:hueOff val="0"/>
+              <a:satOff val="0"/>
+              <a:lumOff val="0"/>
+              <a:alphaOff val="0"/>
+            </a:schemeClr>
+          </a:solidFill>
+          <a:prstDash val="solid"/>
+        </a:ln>
+        <a:effectLst/>
+      </dsp:spPr>
+      <dsp:style>
+        <a:lnRef idx="2">
+          <a:scrgbClr r="0" g="0" b="0"/>
+        </a:lnRef>
+        <a:fillRef idx="0">
+          <a:scrgbClr r="0" g="0" b="0"/>
+        </a:fillRef>
+        <a:effectRef idx="0">
+          <a:scrgbClr r="0" g="0" b="0"/>
+        </a:effectRef>
+        <a:fontRef idx="minor"/>
+      </dsp:style>
+      <dsp:txBody>
+        <a:bodyPr spcFirstLastPara="0" vert="horz" wrap="square" lIns="12700" tIns="0" rIns="12700" bIns="0" numCol="1" spcCol="1270" anchor="ctr" anchorCtr="0">
+          <a:noAutofit/>
+        </a:bodyPr>
+        <a:lstStyle/>
+        <a:p>
+          <a:pPr lvl="0" algn="ctr" defTabSz="222250">
+            <a:lnSpc>
+              <a:spcPct val="90000"/>
+            </a:lnSpc>
+            <a:spcBef>
+              <a:spcPct val="0"/>
+            </a:spcBef>
+            <a:spcAft>
+              <a:spcPct val="35000"/>
+            </a:spcAft>
+          </a:pPr>
+          <a:endParaRPr lang="en-US" sz="500" kern="1200">
+            <a:solidFill>
+              <a:schemeClr val="tx1"/>
+            </a:solidFill>
+          </a:endParaRPr>
+        </a:p>
+      </dsp:txBody>
+      <dsp:txXfrm>
+        <a:off x="3645574" y="291336"/>
+        <a:ext cx="24050" cy="24050"/>
+      </dsp:txXfrm>
+    </dsp:sp>
+    <dsp:sp modelId="{52F7C414-CE7D-4E24-891D-A5D889BDA974}">
+      <dsp:nvSpPr>
+        <dsp:cNvPr id="0" name=""/>
+        <dsp:cNvSpPr/>
+      </dsp:nvSpPr>
+      <dsp:spPr>
+        <a:xfrm>
+          <a:off x="3898106" y="2728"/>
+          <a:ext cx="1202531" cy="601265"/>
+        </a:xfrm>
+        <a:prstGeom prst="roundRect">
+          <a:avLst>
+            <a:gd name="adj" fmla="val 10000"/>
+          </a:avLst>
+        </a:prstGeom>
+        <a:solidFill>
+          <a:schemeClr val="accent5">
+            <a:hueOff val="0"/>
+            <a:satOff val="0"/>
+            <a:lumOff val="0"/>
+            <a:alphaOff val="0"/>
+          </a:schemeClr>
+        </a:solidFill>
+        <a:ln w="55000" cap="flat" cmpd="thickThin" algn="ctr">
+          <a:solidFill>
+            <a:schemeClr val="lt1">
+              <a:hueOff val="0"/>
+              <a:satOff val="0"/>
+              <a:lumOff val="0"/>
+              <a:alphaOff val="0"/>
+            </a:schemeClr>
+          </a:solidFill>
+          <a:prstDash val="solid"/>
+        </a:ln>
+        <a:effectLst/>
+      </dsp:spPr>
+      <dsp:style>
+        <a:lnRef idx="2">
+          <a:scrgbClr r="0" g="0" b="0"/>
+        </a:lnRef>
+        <a:fillRef idx="1">
+          <a:scrgbClr r="0" g="0" b="0"/>
+        </a:fillRef>
+        <a:effectRef idx="0">
+          <a:scrgbClr r="0" g="0" b="0"/>
+        </a:effectRef>
+        <a:fontRef idx="minor">
+          <a:schemeClr val="lt1"/>
+        </a:fontRef>
+      </dsp:style>
+      <dsp:txBody>
+        <a:bodyPr spcFirstLastPara="0" vert="horz" wrap="square" lIns="9525" tIns="9525" rIns="9525" bIns="9525" numCol="1" spcCol="1270" anchor="ctr" anchorCtr="0">
+          <a:noAutofit/>
+        </a:bodyPr>
+        <a:lstStyle/>
+        <a:p>
+          <a:pPr lvl="0" algn="ctr" defTabSz="666750">
+            <a:lnSpc>
+              <a:spcPct val="90000"/>
+            </a:lnSpc>
+            <a:spcBef>
+              <a:spcPct val="0"/>
+            </a:spcBef>
+            <a:spcAft>
+              <a:spcPct val="35000"/>
+            </a:spcAft>
+          </a:pPr>
+          <a:r>
+            <a:rPr lang="en-US" sz="1500" kern="1200" dirty="0" smtClean="0"/>
+            <a:t>++, --, -, !</a:t>
+          </a:r>
+          <a:endParaRPr lang="en-US" sz="1500" kern="1200" dirty="0"/>
+        </a:p>
+      </dsp:txBody>
+      <dsp:txXfrm>
+        <a:off x="3915716" y="20338"/>
+        <a:ext cx="1167311" cy="566045"/>
+      </dsp:txXfrm>
+    </dsp:sp>
+    <dsp:sp modelId="{28A91AF3-F4DA-46D9-A6C2-E9981AE15014}">
+      <dsp:nvSpPr>
+        <dsp:cNvPr id="0" name=""/>
+        <dsp:cNvSpPr/>
+      </dsp:nvSpPr>
+      <dsp:spPr>
+        <a:xfrm rot="21527893">
+          <a:off x="1202419" y="2029299"/>
+          <a:ext cx="1012253" cy="26630"/>
+        </a:xfrm>
+        <a:custGeom>
+          <a:avLst/>
+          <a:gdLst/>
+          <a:ahLst/>
+          <a:cxnLst/>
+          <a:rect l="0" t="0" r="0" b="0"/>
+          <a:pathLst>
+            <a:path>
+              <a:moveTo>
+                <a:pt x="0" y="13315"/>
+              </a:moveTo>
+              <a:lnTo>
+                <a:pt x="1012253" y="13315"/>
+              </a:lnTo>
+            </a:path>
+          </a:pathLst>
+        </a:custGeom>
+        <a:noFill/>
+        <a:ln w="55000" cap="flat" cmpd="thickThin" algn="ctr">
+          <a:solidFill>
+            <a:schemeClr val="accent4">
+              <a:hueOff val="0"/>
+              <a:satOff val="0"/>
+              <a:lumOff val="0"/>
+              <a:alphaOff val="0"/>
+            </a:schemeClr>
+          </a:solidFill>
+          <a:prstDash val="solid"/>
+        </a:ln>
+        <a:effectLst/>
+      </dsp:spPr>
+      <dsp:style>
+        <a:lnRef idx="2">
+          <a:scrgbClr r="0" g="0" b="0"/>
+        </a:lnRef>
+        <a:fillRef idx="0">
+          <a:scrgbClr r="0" g="0" b="0"/>
+        </a:fillRef>
+        <a:effectRef idx="0">
+          <a:scrgbClr r="0" g="0" b="0"/>
+        </a:effectRef>
+        <a:fontRef idx="minor"/>
+      </dsp:style>
+      <dsp:txBody>
+        <a:bodyPr spcFirstLastPara="0" vert="horz" wrap="square" lIns="12700" tIns="0" rIns="12700" bIns="0" numCol="1" spcCol="1270" anchor="ctr" anchorCtr="0">
+          <a:noAutofit/>
+        </a:bodyPr>
+        <a:lstStyle/>
+        <a:p>
+          <a:pPr lvl="0" algn="ctr" defTabSz="222250">
+            <a:lnSpc>
+              <a:spcPct val="90000"/>
+            </a:lnSpc>
+            <a:spcBef>
+              <a:spcPct val="0"/>
+            </a:spcBef>
+            <a:spcAft>
+              <a:spcPct val="35000"/>
+            </a:spcAft>
+          </a:pPr>
+          <a:endParaRPr lang="en-US" sz="500" kern="1200">
+            <a:solidFill>
+              <a:schemeClr val="tx1"/>
+            </a:solidFill>
+          </a:endParaRPr>
+        </a:p>
+      </dsp:txBody>
+      <dsp:txXfrm>
+        <a:off x="1683240" y="2017308"/>
+        <a:ext cx="50612" cy="50612"/>
+      </dsp:txXfrm>
+    </dsp:sp>
+    <dsp:sp modelId="{FF503304-CCE6-4A1C-990C-5578FA7DBE2F}">
+      <dsp:nvSpPr>
+        <dsp:cNvPr id="0" name=""/>
+        <dsp:cNvSpPr/>
+      </dsp:nvSpPr>
+      <dsp:spPr>
+        <a:xfrm>
+          <a:off x="2214562" y="1731367"/>
+          <a:ext cx="1202531" cy="601265"/>
+        </a:xfrm>
+        <a:prstGeom prst="roundRect">
+          <a:avLst>
+            <a:gd name="adj" fmla="val 10000"/>
+          </a:avLst>
+        </a:prstGeom>
+        <a:solidFill>
+          <a:schemeClr val="accent4">
+            <a:hueOff val="0"/>
+            <a:satOff val="0"/>
+            <a:lumOff val="0"/>
+            <a:alphaOff val="0"/>
+          </a:schemeClr>
+        </a:solidFill>
+        <a:ln w="55000" cap="flat" cmpd="thickThin" algn="ctr">
+          <a:solidFill>
+            <a:schemeClr val="lt1">
+              <a:hueOff val="0"/>
+              <a:satOff val="0"/>
+              <a:lumOff val="0"/>
+              <a:alphaOff val="0"/>
+            </a:schemeClr>
+          </a:solidFill>
+          <a:prstDash val="solid"/>
+        </a:ln>
+        <a:effectLst/>
+      </dsp:spPr>
+      <dsp:style>
+        <a:lnRef idx="2">
+          <a:scrgbClr r="0" g="0" b="0"/>
+        </a:lnRef>
+        <a:fillRef idx="1">
+          <a:scrgbClr r="0" g="0" b="0"/>
+        </a:fillRef>
+        <a:effectRef idx="0">
+          <a:scrgbClr r="0" g="0" b="0"/>
+        </a:effectRef>
+        <a:fontRef idx="minor">
+          <a:schemeClr val="lt1"/>
+        </a:fontRef>
+      </dsp:style>
+      <dsp:txBody>
+        <a:bodyPr spcFirstLastPara="0" vert="horz" wrap="square" lIns="9525" tIns="9525" rIns="9525" bIns="9525" numCol="1" spcCol="1270" anchor="ctr" anchorCtr="0">
+          <a:noAutofit/>
+        </a:bodyPr>
+        <a:lstStyle/>
+        <a:p>
+          <a:pPr lvl="0" algn="ctr" defTabSz="666750">
+            <a:lnSpc>
+              <a:spcPct val="90000"/>
+            </a:lnSpc>
+            <a:spcBef>
+              <a:spcPct val="0"/>
+            </a:spcBef>
+            <a:spcAft>
+              <a:spcPct val="35000"/>
+            </a:spcAft>
+          </a:pPr>
+          <a:r>
+            <a:rPr lang="en-US" sz="1500" kern="1200" dirty="0" smtClean="0"/>
+            <a:t>Binary</a:t>
+          </a:r>
+          <a:endParaRPr lang="en-US" sz="1500" kern="1200" dirty="0"/>
+        </a:p>
+      </dsp:txBody>
+      <dsp:txXfrm>
+        <a:off x="2232172" y="1748977"/>
+        <a:ext cx="1167311" cy="566045"/>
+      </dsp:txXfrm>
+    </dsp:sp>
+    <dsp:sp modelId="{447F65B9-1F2A-4FBB-ACD1-ABFC2FCF7F43}">
+      <dsp:nvSpPr>
+        <dsp:cNvPr id="0" name=""/>
+        <dsp:cNvSpPr/>
+      </dsp:nvSpPr>
+      <dsp:spPr>
+        <a:xfrm rot="17692822">
+          <a:off x="3085952" y="1500092"/>
+          <a:ext cx="1143294" cy="26630"/>
+        </a:xfrm>
+        <a:custGeom>
+          <a:avLst/>
+          <a:gdLst/>
+          <a:ahLst/>
+          <a:cxnLst/>
+          <a:rect l="0" t="0" r="0" b="0"/>
+          <a:pathLst>
+            <a:path>
+              <a:moveTo>
+                <a:pt x="0" y="13315"/>
+              </a:moveTo>
+              <a:lnTo>
+                <a:pt x="1143294" y="13315"/>
+              </a:lnTo>
+            </a:path>
+          </a:pathLst>
+        </a:custGeom>
+        <a:noFill/>
+        <a:ln w="55000" cap="flat" cmpd="thickThin" algn="ctr">
+          <a:solidFill>
+            <a:schemeClr val="accent5">
+              <a:hueOff val="0"/>
+              <a:satOff val="0"/>
+              <a:lumOff val="0"/>
+              <a:alphaOff val="0"/>
+            </a:schemeClr>
+          </a:solidFill>
+          <a:prstDash val="solid"/>
+        </a:ln>
+        <a:effectLst/>
+      </dsp:spPr>
+      <dsp:style>
+        <a:lnRef idx="2">
+          <a:scrgbClr r="0" g="0" b="0"/>
+        </a:lnRef>
+        <a:fillRef idx="0">
+          <a:scrgbClr r="0" g="0" b="0"/>
+        </a:fillRef>
+        <a:effectRef idx="0">
+          <a:scrgbClr r="0" g="0" b="0"/>
+        </a:effectRef>
+        <a:fontRef idx="minor"/>
+      </dsp:style>
+      <dsp:txBody>
+        <a:bodyPr spcFirstLastPara="0" vert="horz" wrap="square" lIns="12700" tIns="0" rIns="12700" bIns="0" numCol="1" spcCol="1270" anchor="ctr" anchorCtr="0">
+          <a:noAutofit/>
+        </a:bodyPr>
+        <a:lstStyle/>
+        <a:p>
+          <a:pPr lvl="0" algn="ctr" defTabSz="222250">
+            <a:lnSpc>
+              <a:spcPct val="90000"/>
+            </a:lnSpc>
+            <a:spcBef>
+              <a:spcPct val="0"/>
+            </a:spcBef>
+            <a:spcAft>
+              <a:spcPct val="35000"/>
+            </a:spcAft>
+          </a:pPr>
+          <a:endParaRPr lang="en-US" sz="500" kern="1200">
+            <a:solidFill>
+              <a:schemeClr val="tx1"/>
+            </a:solidFill>
+          </a:endParaRPr>
+        </a:p>
+      </dsp:txBody>
+      <dsp:txXfrm>
+        <a:off x="3629017" y="1484826"/>
+        <a:ext cx="57164" cy="57164"/>
+      </dsp:txXfrm>
+    </dsp:sp>
+    <dsp:sp modelId="{8557AE4D-D2B7-4A53-AA87-E3C6C8022E4D}">
+      <dsp:nvSpPr>
+        <dsp:cNvPr id="0" name=""/>
+        <dsp:cNvSpPr/>
+      </dsp:nvSpPr>
+      <dsp:spPr>
+        <a:xfrm>
+          <a:off x="3898106" y="694183"/>
+          <a:ext cx="1202531" cy="601265"/>
+        </a:xfrm>
+        <a:prstGeom prst="roundRect">
+          <a:avLst>
+            <a:gd name="adj" fmla="val 10000"/>
+          </a:avLst>
+        </a:prstGeom>
+        <a:solidFill>
+          <a:schemeClr val="accent5">
+            <a:hueOff val="0"/>
+            <a:satOff val="0"/>
+            <a:lumOff val="0"/>
+            <a:alphaOff val="0"/>
+          </a:schemeClr>
+        </a:solidFill>
+        <a:ln w="55000" cap="flat" cmpd="thickThin" algn="ctr">
+          <a:solidFill>
+            <a:schemeClr val="lt1">
+              <a:hueOff val="0"/>
+              <a:satOff val="0"/>
+              <a:lumOff val="0"/>
+              <a:alphaOff val="0"/>
+            </a:schemeClr>
+          </a:solidFill>
+          <a:prstDash val="solid"/>
+        </a:ln>
+        <a:effectLst/>
+      </dsp:spPr>
+      <dsp:style>
+        <a:lnRef idx="2">
+          <a:scrgbClr r="0" g="0" b="0"/>
+        </a:lnRef>
+        <a:fillRef idx="1">
+          <a:scrgbClr r="0" g="0" b="0"/>
+        </a:fillRef>
+        <a:effectRef idx="0">
+          <a:scrgbClr r="0" g="0" b="0"/>
+        </a:effectRef>
+        <a:fontRef idx="minor">
+          <a:schemeClr val="lt1"/>
+        </a:fontRef>
+      </dsp:style>
+      <dsp:txBody>
+        <a:bodyPr spcFirstLastPara="0" vert="horz" wrap="square" lIns="9525" tIns="9525" rIns="9525" bIns="9525" numCol="1" spcCol="1270" anchor="ctr" anchorCtr="0">
+          <a:noAutofit/>
+        </a:bodyPr>
+        <a:lstStyle/>
+        <a:p>
+          <a:pPr lvl="0" algn="ctr" defTabSz="666750">
+            <a:lnSpc>
+              <a:spcPct val="90000"/>
+            </a:lnSpc>
+            <a:spcBef>
+              <a:spcPct val="0"/>
+            </a:spcBef>
+            <a:spcAft>
+              <a:spcPct val="35000"/>
+            </a:spcAft>
+          </a:pPr>
+          <a:r>
+            <a:rPr lang="en-US" sz="1500" kern="1200" dirty="0" smtClean="0"/>
+            <a:t>Arithmetic</a:t>
+          </a:r>
+          <a:endParaRPr lang="en-US" sz="1500" kern="1200" dirty="0"/>
+        </a:p>
+      </dsp:txBody>
+      <dsp:txXfrm>
+        <a:off x="3915716" y="711793"/>
+        <a:ext cx="1167311" cy="566045"/>
+      </dsp:txXfrm>
+    </dsp:sp>
+    <dsp:sp modelId="{25E9BE56-299E-4C35-AEFA-CD5617E93DF6}">
+      <dsp:nvSpPr>
+        <dsp:cNvPr id="0" name=""/>
+        <dsp:cNvSpPr/>
+      </dsp:nvSpPr>
+      <dsp:spPr>
+        <a:xfrm>
+          <a:off x="5100637" y="981501"/>
+          <a:ext cx="481012" cy="26630"/>
+        </a:xfrm>
+        <a:custGeom>
+          <a:avLst/>
+          <a:gdLst/>
+          <a:ahLst/>
+          <a:cxnLst/>
+          <a:rect l="0" t="0" r="0" b="0"/>
+          <a:pathLst>
+            <a:path>
+              <a:moveTo>
+                <a:pt x="0" y="13315"/>
+              </a:moveTo>
+              <a:lnTo>
+                <a:pt x="481012" y="13315"/>
+              </a:lnTo>
+            </a:path>
+          </a:pathLst>
+        </a:custGeom>
+        <a:noFill/>
+        <a:ln w="55000" cap="flat" cmpd="thickThin" algn="ctr">
+          <a:solidFill>
+            <a:schemeClr val="accent6">
+              <a:hueOff val="0"/>
+              <a:satOff val="0"/>
+              <a:lumOff val="0"/>
+              <a:alphaOff val="0"/>
+            </a:schemeClr>
+          </a:solidFill>
+          <a:prstDash val="solid"/>
+        </a:ln>
+        <a:effectLst/>
+      </dsp:spPr>
+      <dsp:style>
+        <a:lnRef idx="2">
+          <a:scrgbClr r="0" g="0" b="0"/>
+        </a:lnRef>
+        <a:fillRef idx="0">
+          <a:scrgbClr r="0" g="0" b="0"/>
+        </a:fillRef>
+        <a:effectRef idx="0">
+          <a:scrgbClr r="0" g="0" b="0"/>
+        </a:effectRef>
+        <a:fontRef idx="minor"/>
+      </dsp:style>
+      <dsp:txBody>
+        <a:bodyPr spcFirstLastPara="0" vert="horz" wrap="square" lIns="12700" tIns="0" rIns="12700" bIns="0" numCol="1" spcCol="1270" anchor="ctr" anchorCtr="0">
+          <a:noAutofit/>
+        </a:bodyPr>
+        <a:lstStyle/>
+        <a:p>
+          <a:pPr lvl="0" algn="ctr" defTabSz="222250">
+            <a:lnSpc>
+              <a:spcPct val="90000"/>
+            </a:lnSpc>
+            <a:spcBef>
+              <a:spcPct val="0"/>
+            </a:spcBef>
+            <a:spcAft>
+              <a:spcPct val="35000"/>
+            </a:spcAft>
+          </a:pPr>
+          <a:endParaRPr lang="en-US" sz="500" kern="1200">
+            <a:solidFill>
+              <a:schemeClr val="tx1"/>
+            </a:solidFill>
+          </a:endParaRPr>
+        </a:p>
+      </dsp:txBody>
+      <dsp:txXfrm>
+        <a:off x="5329118" y="982791"/>
+        <a:ext cx="24050" cy="24050"/>
+      </dsp:txXfrm>
+    </dsp:sp>
+    <dsp:sp modelId="{491CCBE5-49DF-4375-B178-811F45C23044}">
+      <dsp:nvSpPr>
+        <dsp:cNvPr id="0" name=""/>
+        <dsp:cNvSpPr/>
+      </dsp:nvSpPr>
+      <dsp:spPr>
+        <a:xfrm>
+          <a:off x="5581650" y="694183"/>
+          <a:ext cx="1202531" cy="601265"/>
+        </a:xfrm>
+        <a:prstGeom prst="roundRect">
+          <a:avLst>
+            <a:gd name="adj" fmla="val 10000"/>
+          </a:avLst>
+        </a:prstGeom>
+        <a:solidFill>
+          <a:schemeClr val="accent6">
+            <a:hueOff val="0"/>
+            <a:satOff val="0"/>
+            <a:lumOff val="0"/>
+            <a:alphaOff val="0"/>
+          </a:schemeClr>
+        </a:solidFill>
+        <a:ln w="55000" cap="flat" cmpd="thickThin" algn="ctr">
+          <a:solidFill>
+            <a:schemeClr val="lt1">
+              <a:hueOff val="0"/>
+              <a:satOff val="0"/>
+              <a:lumOff val="0"/>
+              <a:alphaOff val="0"/>
+            </a:schemeClr>
+          </a:solidFill>
+          <a:prstDash val="solid"/>
+        </a:ln>
+        <a:effectLst/>
+      </dsp:spPr>
+      <dsp:style>
+        <a:lnRef idx="2">
+          <a:scrgbClr r="0" g="0" b="0"/>
+        </a:lnRef>
+        <a:fillRef idx="1">
+          <a:scrgbClr r="0" g="0" b="0"/>
+        </a:fillRef>
+        <a:effectRef idx="0">
+          <a:scrgbClr r="0" g="0" b="0"/>
+        </a:effectRef>
+        <a:fontRef idx="minor">
+          <a:schemeClr val="lt1"/>
+        </a:fontRef>
+      </dsp:style>
+      <dsp:txBody>
+        <a:bodyPr spcFirstLastPara="0" vert="horz" wrap="square" lIns="9525" tIns="9525" rIns="9525" bIns="9525" numCol="1" spcCol="1270" anchor="ctr" anchorCtr="0">
+          <a:noAutofit/>
+        </a:bodyPr>
+        <a:lstStyle/>
+        <a:p>
+          <a:pPr lvl="0" algn="ctr" defTabSz="666750">
+            <a:lnSpc>
+              <a:spcPct val="90000"/>
+            </a:lnSpc>
+            <a:spcBef>
+              <a:spcPct val="0"/>
+            </a:spcBef>
+            <a:spcAft>
+              <a:spcPct val="35000"/>
+            </a:spcAft>
+          </a:pPr>
+          <a:r>
+            <a:rPr lang="en-US" sz="1500" kern="1200" dirty="0" smtClean="0"/>
+            <a:t>+, -, *, /, %</a:t>
+          </a:r>
+          <a:endParaRPr lang="en-US" sz="1500" kern="1200" dirty="0"/>
+        </a:p>
+      </dsp:txBody>
+      <dsp:txXfrm>
+        <a:off x="5599260" y="711793"/>
+        <a:ext cx="1167311" cy="566045"/>
+      </dsp:txXfrm>
+    </dsp:sp>
+    <dsp:sp modelId="{7BF375AB-F70B-4829-89ED-58BA5B4C3501}">
+      <dsp:nvSpPr>
+        <dsp:cNvPr id="0" name=""/>
+        <dsp:cNvSpPr/>
+      </dsp:nvSpPr>
+      <dsp:spPr>
+        <a:xfrm rot="19457599">
+          <a:off x="3361415" y="1845820"/>
+          <a:ext cx="592368" cy="26630"/>
+        </a:xfrm>
+        <a:custGeom>
+          <a:avLst/>
+          <a:gdLst/>
+          <a:ahLst/>
+          <a:cxnLst/>
+          <a:rect l="0" t="0" r="0" b="0"/>
+          <a:pathLst>
+            <a:path>
+              <a:moveTo>
+                <a:pt x="0" y="13315"/>
+              </a:moveTo>
+              <a:lnTo>
+                <a:pt x="592368" y="13315"/>
+              </a:lnTo>
+            </a:path>
+          </a:pathLst>
+        </a:custGeom>
+        <a:noFill/>
+        <a:ln w="55000" cap="flat" cmpd="thickThin" algn="ctr">
+          <a:solidFill>
+            <a:schemeClr val="accent5">
+              <a:hueOff val="0"/>
+              <a:satOff val="0"/>
+              <a:lumOff val="0"/>
+              <a:alphaOff val="0"/>
+            </a:schemeClr>
+          </a:solidFill>
+          <a:prstDash val="solid"/>
+        </a:ln>
+        <a:effectLst/>
+      </dsp:spPr>
+      <dsp:style>
+        <a:lnRef idx="2">
+          <a:scrgbClr r="0" g="0" b="0"/>
+        </a:lnRef>
+        <a:fillRef idx="0">
+          <a:scrgbClr r="0" g="0" b="0"/>
+        </a:fillRef>
+        <a:effectRef idx="0">
+          <a:scrgbClr r="0" g="0" b="0"/>
+        </a:effectRef>
+        <a:fontRef idx="minor"/>
+      </dsp:style>
+      <dsp:txBody>
+        <a:bodyPr spcFirstLastPara="0" vert="horz" wrap="square" lIns="12700" tIns="0" rIns="12700" bIns="0" numCol="1" spcCol="1270" anchor="ctr" anchorCtr="0">
+          <a:noAutofit/>
+        </a:bodyPr>
+        <a:lstStyle/>
+        <a:p>
+          <a:pPr lvl="0" algn="ctr" defTabSz="222250">
+            <a:lnSpc>
+              <a:spcPct val="90000"/>
+            </a:lnSpc>
+            <a:spcBef>
+              <a:spcPct val="0"/>
+            </a:spcBef>
+            <a:spcAft>
+              <a:spcPct val="35000"/>
+            </a:spcAft>
+          </a:pPr>
+          <a:endParaRPr lang="en-US" sz="500" kern="1200">
+            <a:solidFill>
+              <a:schemeClr val="tx1"/>
+            </a:solidFill>
+          </a:endParaRPr>
+        </a:p>
+      </dsp:txBody>
+      <dsp:txXfrm>
+        <a:off x="3642790" y="1844326"/>
+        <a:ext cx="29618" cy="29618"/>
+      </dsp:txXfrm>
+    </dsp:sp>
+    <dsp:sp modelId="{617451F6-02F5-4B5F-9C82-217A464ED8C7}">
+      <dsp:nvSpPr>
+        <dsp:cNvPr id="0" name=""/>
+        <dsp:cNvSpPr/>
+      </dsp:nvSpPr>
+      <dsp:spPr>
+        <a:xfrm>
+          <a:off x="3898106" y="1385639"/>
+          <a:ext cx="1202531" cy="601265"/>
+        </a:xfrm>
+        <a:prstGeom prst="roundRect">
+          <a:avLst>
+            <a:gd name="adj" fmla="val 10000"/>
+          </a:avLst>
+        </a:prstGeom>
+        <a:solidFill>
+          <a:schemeClr val="accent5">
+            <a:hueOff val="0"/>
+            <a:satOff val="0"/>
+            <a:lumOff val="0"/>
+            <a:alphaOff val="0"/>
+          </a:schemeClr>
+        </a:solidFill>
+        <a:ln w="55000" cap="flat" cmpd="thickThin" algn="ctr">
+          <a:solidFill>
+            <a:schemeClr val="lt1">
+              <a:hueOff val="0"/>
+              <a:satOff val="0"/>
+              <a:lumOff val="0"/>
+              <a:alphaOff val="0"/>
+            </a:schemeClr>
+          </a:solidFill>
+          <a:prstDash val="solid"/>
+        </a:ln>
+        <a:effectLst/>
+      </dsp:spPr>
+      <dsp:style>
+        <a:lnRef idx="2">
+          <a:scrgbClr r="0" g="0" b="0"/>
+        </a:lnRef>
+        <a:fillRef idx="1">
+          <a:scrgbClr r="0" g="0" b="0"/>
+        </a:fillRef>
+        <a:effectRef idx="0">
+          <a:scrgbClr r="0" g="0" b="0"/>
+        </a:effectRef>
+        <a:fontRef idx="minor">
+          <a:schemeClr val="lt1"/>
+        </a:fontRef>
+      </dsp:style>
+      <dsp:txBody>
+        <a:bodyPr spcFirstLastPara="0" vert="horz" wrap="square" lIns="9525" tIns="9525" rIns="9525" bIns="9525" numCol="1" spcCol="1270" anchor="ctr" anchorCtr="0">
+          <a:noAutofit/>
+        </a:bodyPr>
+        <a:lstStyle/>
+        <a:p>
+          <a:pPr lvl="0" algn="ctr" defTabSz="666750">
+            <a:lnSpc>
+              <a:spcPct val="90000"/>
+            </a:lnSpc>
+            <a:spcBef>
+              <a:spcPct val="0"/>
+            </a:spcBef>
+            <a:spcAft>
+              <a:spcPct val="35000"/>
+            </a:spcAft>
+          </a:pPr>
+          <a:r>
+            <a:rPr lang="en-US" sz="1500" kern="1200" smtClean="0"/>
+            <a:t>Conditional</a:t>
+          </a:r>
+          <a:endParaRPr lang="en-US" sz="1500" kern="1200" dirty="0"/>
+        </a:p>
+      </dsp:txBody>
+      <dsp:txXfrm>
+        <a:off x="3915716" y="1403249"/>
+        <a:ext cx="1167311" cy="566045"/>
+      </dsp:txXfrm>
+    </dsp:sp>
+    <dsp:sp modelId="{FC72337D-7B3E-46A6-81E9-4D4876D10BDB}">
+      <dsp:nvSpPr>
+        <dsp:cNvPr id="0" name=""/>
+        <dsp:cNvSpPr/>
+      </dsp:nvSpPr>
+      <dsp:spPr>
+        <a:xfrm>
+          <a:off x="5100637" y="1672956"/>
+          <a:ext cx="481012" cy="26630"/>
+        </a:xfrm>
+        <a:custGeom>
+          <a:avLst/>
+          <a:gdLst/>
+          <a:ahLst/>
+          <a:cxnLst/>
+          <a:rect l="0" t="0" r="0" b="0"/>
+          <a:pathLst>
+            <a:path>
+              <a:moveTo>
+                <a:pt x="0" y="13315"/>
+              </a:moveTo>
+              <a:lnTo>
+                <a:pt x="481012" y="13315"/>
+              </a:lnTo>
+            </a:path>
+          </a:pathLst>
+        </a:custGeom>
+        <a:noFill/>
+        <a:ln w="55000" cap="flat" cmpd="thickThin" algn="ctr">
+          <a:solidFill>
+            <a:schemeClr val="accent6">
+              <a:hueOff val="0"/>
+              <a:satOff val="0"/>
+              <a:lumOff val="0"/>
+              <a:alphaOff val="0"/>
+            </a:schemeClr>
+          </a:solidFill>
+          <a:prstDash val="solid"/>
+        </a:ln>
+        <a:effectLst/>
+      </dsp:spPr>
+      <dsp:style>
+        <a:lnRef idx="2">
+          <a:scrgbClr r="0" g="0" b="0"/>
+        </a:lnRef>
+        <a:fillRef idx="0">
+          <a:scrgbClr r="0" g="0" b="0"/>
+        </a:fillRef>
+        <a:effectRef idx="0">
+          <a:scrgbClr r="0" g="0" b="0"/>
+        </a:effectRef>
+        <a:fontRef idx="minor"/>
+      </dsp:style>
+      <dsp:txBody>
+        <a:bodyPr spcFirstLastPara="0" vert="horz" wrap="square" lIns="12700" tIns="0" rIns="12700" bIns="0" numCol="1" spcCol="1270" anchor="ctr" anchorCtr="0">
+          <a:noAutofit/>
+        </a:bodyPr>
+        <a:lstStyle/>
+        <a:p>
+          <a:pPr lvl="0" algn="ctr" defTabSz="222250">
+            <a:lnSpc>
+              <a:spcPct val="90000"/>
+            </a:lnSpc>
+            <a:spcBef>
+              <a:spcPct val="0"/>
+            </a:spcBef>
+            <a:spcAft>
+              <a:spcPct val="35000"/>
+            </a:spcAft>
+          </a:pPr>
+          <a:endParaRPr lang="en-US" sz="500" kern="1200">
+            <a:solidFill>
+              <a:schemeClr val="tx1"/>
+            </a:solidFill>
+          </a:endParaRPr>
+        </a:p>
+      </dsp:txBody>
+      <dsp:txXfrm>
+        <a:off x="5329118" y="1674246"/>
+        <a:ext cx="24050" cy="24050"/>
+      </dsp:txXfrm>
+    </dsp:sp>
+    <dsp:sp modelId="{22F1F4FB-7A19-46EF-A547-E849282E849E}">
+      <dsp:nvSpPr>
+        <dsp:cNvPr id="0" name=""/>
+        <dsp:cNvSpPr/>
+      </dsp:nvSpPr>
+      <dsp:spPr>
+        <a:xfrm>
+          <a:off x="5581650" y="1385639"/>
+          <a:ext cx="1202531" cy="601265"/>
+        </a:xfrm>
+        <a:prstGeom prst="roundRect">
+          <a:avLst>
+            <a:gd name="adj" fmla="val 10000"/>
+          </a:avLst>
+        </a:prstGeom>
+        <a:solidFill>
+          <a:schemeClr val="accent6">
+            <a:hueOff val="0"/>
+            <a:satOff val="0"/>
+            <a:lumOff val="0"/>
+            <a:alphaOff val="0"/>
+          </a:schemeClr>
+        </a:solidFill>
+        <a:ln w="55000" cap="flat" cmpd="thickThin" algn="ctr">
+          <a:solidFill>
+            <a:schemeClr val="lt1">
+              <a:hueOff val="0"/>
+              <a:satOff val="0"/>
+              <a:lumOff val="0"/>
+              <a:alphaOff val="0"/>
+            </a:schemeClr>
+          </a:solidFill>
+          <a:prstDash val="solid"/>
+        </a:ln>
+        <a:effectLst/>
+      </dsp:spPr>
+      <dsp:style>
+        <a:lnRef idx="2">
+          <a:scrgbClr r="0" g="0" b="0"/>
+        </a:lnRef>
+        <a:fillRef idx="1">
+          <a:scrgbClr r="0" g="0" b="0"/>
+        </a:fillRef>
+        <a:effectRef idx="0">
+          <a:scrgbClr r="0" g="0" b="0"/>
+        </a:effectRef>
+        <a:fontRef idx="minor">
+          <a:schemeClr val="lt1"/>
+        </a:fontRef>
+      </dsp:style>
+      <dsp:txBody>
+        <a:bodyPr spcFirstLastPara="0" vert="horz" wrap="square" lIns="9525" tIns="9525" rIns="9525" bIns="9525" numCol="1" spcCol="1270" anchor="ctr" anchorCtr="0">
+          <a:noAutofit/>
+        </a:bodyPr>
+        <a:lstStyle/>
+        <a:p>
+          <a:pPr lvl="0" algn="ctr" defTabSz="666750">
+            <a:lnSpc>
+              <a:spcPct val="90000"/>
+            </a:lnSpc>
+            <a:spcBef>
+              <a:spcPct val="0"/>
+            </a:spcBef>
+            <a:spcAft>
+              <a:spcPct val="35000"/>
+            </a:spcAft>
+          </a:pPr>
+          <a:r>
+            <a:rPr lang="en-US" sz="1500" kern="1200" dirty="0" smtClean="0"/>
+            <a:t>&lt;, &gt;, &lt;=, &gt;=, ==, !=</a:t>
+          </a:r>
+          <a:endParaRPr lang="en-US" sz="1500" kern="1200" dirty="0"/>
+        </a:p>
+      </dsp:txBody>
+      <dsp:txXfrm>
+        <a:off x="5599260" y="1403249"/>
+        <a:ext cx="1167311" cy="566045"/>
+      </dsp:txXfrm>
+    </dsp:sp>
+    <dsp:sp modelId="{D5DA7A14-F1CF-444D-B648-7C1C7973D432}">
+      <dsp:nvSpPr>
+        <dsp:cNvPr id="0" name=""/>
+        <dsp:cNvSpPr/>
+      </dsp:nvSpPr>
+      <dsp:spPr>
+        <a:xfrm rot="2142401">
+          <a:off x="3361415" y="2191548"/>
+          <a:ext cx="592368" cy="26630"/>
+        </a:xfrm>
+        <a:custGeom>
+          <a:avLst/>
+          <a:gdLst/>
+          <a:ahLst/>
+          <a:cxnLst/>
+          <a:rect l="0" t="0" r="0" b="0"/>
+          <a:pathLst>
+            <a:path>
+              <a:moveTo>
+                <a:pt x="0" y="13315"/>
+              </a:moveTo>
+              <a:lnTo>
+                <a:pt x="592368" y="13315"/>
+              </a:lnTo>
+            </a:path>
+          </a:pathLst>
+        </a:custGeom>
+        <a:noFill/>
+        <a:ln w="55000" cap="flat" cmpd="thickThin" algn="ctr">
+          <a:solidFill>
+            <a:schemeClr val="accent5">
+              <a:hueOff val="0"/>
+              <a:satOff val="0"/>
+              <a:lumOff val="0"/>
+              <a:alphaOff val="0"/>
+            </a:schemeClr>
+          </a:solidFill>
+          <a:prstDash val="solid"/>
+        </a:ln>
+        <a:effectLst/>
+      </dsp:spPr>
+      <dsp:style>
+        <a:lnRef idx="2">
+          <a:scrgbClr r="0" g="0" b="0"/>
+        </a:lnRef>
+        <a:fillRef idx="0">
+          <a:scrgbClr r="0" g="0" b="0"/>
+        </a:fillRef>
+        <a:effectRef idx="0">
+          <a:scrgbClr r="0" g="0" b="0"/>
+        </a:effectRef>
+        <a:fontRef idx="minor"/>
+      </dsp:style>
+      <dsp:txBody>
+        <a:bodyPr spcFirstLastPara="0" vert="horz" wrap="square" lIns="12700" tIns="0" rIns="12700" bIns="0" numCol="1" spcCol="1270" anchor="ctr" anchorCtr="0">
+          <a:noAutofit/>
+        </a:bodyPr>
+        <a:lstStyle/>
+        <a:p>
+          <a:pPr lvl="0" algn="ctr" defTabSz="222250">
+            <a:lnSpc>
+              <a:spcPct val="90000"/>
+            </a:lnSpc>
+            <a:spcBef>
+              <a:spcPct val="0"/>
+            </a:spcBef>
+            <a:spcAft>
+              <a:spcPct val="35000"/>
+            </a:spcAft>
+          </a:pPr>
+          <a:endParaRPr lang="en-US" sz="500" kern="1200">
+            <a:solidFill>
+              <a:schemeClr val="tx1"/>
+            </a:solidFill>
+          </a:endParaRPr>
+        </a:p>
+      </dsp:txBody>
+      <dsp:txXfrm>
+        <a:off x="3642790" y="2190054"/>
+        <a:ext cx="29618" cy="29618"/>
+      </dsp:txXfrm>
+    </dsp:sp>
+    <dsp:sp modelId="{575D1F8C-5B1D-41CE-99DB-693659514D2B}">
+      <dsp:nvSpPr>
+        <dsp:cNvPr id="0" name=""/>
+        <dsp:cNvSpPr/>
+      </dsp:nvSpPr>
+      <dsp:spPr>
+        <a:xfrm>
+          <a:off x="3898106" y="2077094"/>
+          <a:ext cx="1202531" cy="601265"/>
+        </a:xfrm>
+        <a:prstGeom prst="roundRect">
+          <a:avLst>
+            <a:gd name="adj" fmla="val 10000"/>
+          </a:avLst>
+        </a:prstGeom>
+        <a:solidFill>
+          <a:schemeClr val="accent5">
+            <a:hueOff val="0"/>
+            <a:satOff val="0"/>
+            <a:lumOff val="0"/>
+            <a:alphaOff val="0"/>
+          </a:schemeClr>
+        </a:solidFill>
+        <a:ln w="55000" cap="flat" cmpd="thickThin" algn="ctr">
+          <a:solidFill>
+            <a:schemeClr val="lt1">
+              <a:hueOff val="0"/>
+              <a:satOff val="0"/>
+              <a:lumOff val="0"/>
+              <a:alphaOff val="0"/>
+            </a:schemeClr>
+          </a:solidFill>
+          <a:prstDash val="solid"/>
+        </a:ln>
+        <a:effectLst/>
+      </dsp:spPr>
+      <dsp:style>
+        <a:lnRef idx="2">
+          <a:scrgbClr r="0" g="0" b="0"/>
+        </a:lnRef>
+        <a:fillRef idx="1">
+          <a:scrgbClr r="0" g="0" b="0"/>
+        </a:fillRef>
+        <a:effectRef idx="0">
+          <a:scrgbClr r="0" g="0" b="0"/>
+        </a:effectRef>
+        <a:fontRef idx="minor">
+          <a:schemeClr val="lt1"/>
+        </a:fontRef>
+      </dsp:style>
+      <dsp:txBody>
+        <a:bodyPr spcFirstLastPara="0" vert="horz" wrap="square" lIns="9525" tIns="9525" rIns="9525" bIns="9525" numCol="1" spcCol="1270" anchor="ctr" anchorCtr="0">
+          <a:noAutofit/>
+        </a:bodyPr>
+        <a:lstStyle/>
+        <a:p>
+          <a:pPr lvl="0" algn="ctr" defTabSz="666750">
+            <a:lnSpc>
+              <a:spcPct val="90000"/>
+            </a:lnSpc>
+            <a:spcBef>
+              <a:spcPct val="0"/>
+            </a:spcBef>
+            <a:spcAft>
+              <a:spcPct val="35000"/>
+            </a:spcAft>
+          </a:pPr>
+          <a:r>
+            <a:rPr lang="en-US" sz="1500" kern="1200" smtClean="0"/>
+            <a:t>Assignment</a:t>
+          </a:r>
+          <a:endParaRPr lang="en-US" sz="1500" kern="1200" dirty="0"/>
+        </a:p>
+      </dsp:txBody>
+      <dsp:txXfrm>
+        <a:off x="3915716" y="2094704"/>
+        <a:ext cx="1167311" cy="566045"/>
+      </dsp:txXfrm>
+    </dsp:sp>
+    <dsp:sp modelId="{CC2A4DA4-04AD-48CA-BB26-A639867E3BA2}">
+      <dsp:nvSpPr>
+        <dsp:cNvPr id="0" name=""/>
+        <dsp:cNvSpPr/>
+      </dsp:nvSpPr>
+      <dsp:spPr>
+        <a:xfrm>
+          <a:off x="5100637" y="2364412"/>
+          <a:ext cx="481012" cy="26630"/>
+        </a:xfrm>
+        <a:custGeom>
+          <a:avLst/>
+          <a:gdLst/>
+          <a:ahLst/>
+          <a:cxnLst/>
+          <a:rect l="0" t="0" r="0" b="0"/>
+          <a:pathLst>
+            <a:path>
+              <a:moveTo>
+                <a:pt x="0" y="13315"/>
+              </a:moveTo>
+              <a:lnTo>
+                <a:pt x="481012" y="13315"/>
+              </a:lnTo>
+            </a:path>
+          </a:pathLst>
+        </a:custGeom>
+        <a:noFill/>
+        <a:ln w="55000" cap="flat" cmpd="thickThin" algn="ctr">
+          <a:solidFill>
+            <a:schemeClr val="accent6">
+              <a:hueOff val="0"/>
+              <a:satOff val="0"/>
+              <a:lumOff val="0"/>
+              <a:alphaOff val="0"/>
+            </a:schemeClr>
+          </a:solidFill>
+          <a:prstDash val="solid"/>
+        </a:ln>
+        <a:effectLst/>
+      </dsp:spPr>
+      <dsp:style>
+        <a:lnRef idx="2">
+          <a:scrgbClr r="0" g="0" b="0"/>
+        </a:lnRef>
+        <a:fillRef idx="0">
+          <a:scrgbClr r="0" g="0" b="0"/>
+        </a:fillRef>
+        <a:effectRef idx="0">
+          <a:scrgbClr r="0" g="0" b="0"/>
+        </a:effectRef>
+        <a:fontRef idx="minor"/>
+      </dsp:style>
+      <dsp:txBody>
+        <a:bodyPr spcFirstLastPara="0" vert="horz" wrap="square" lIns="12700" tIns="0" rIns="12700" bIns="0" numCol="1" spcCol="1270" anchor="ctr" anchorCtr="0">
+          <a:noAutofit/>
+        </a:bodyPr>
+        <a:lstStyle/>
+        <a:p>
+          <a:pPr lvl="0" algn="ctr" defTabSz="222250">
+            <a:lnSpc>
+              <a:spcPct val="90000"/>
+            </a:lnSpc>
+            <a:spcBef>
+              <a:spcPct val="0"/>
+            </a:spcBef>
+            <a:spcAft>
+              <a:spcPct val="35000"/>
+            </a:spcAft>
+          </a:pPr>
+          <a:endParaRPr lang="en-US" sz="500" kern="1200">
+            <a:solidFill>
+              <a:schemeClr val="tx1"/>
+            </a:solidFill>
+          </a:endParaRPr>
+        </a:p>
+      </dsp:txBody>
+      <dsp:txXfrm>
+        <a:off x="5329118" y="2365702"/>
+        <a:ext cx="24050" cy="24050"/>
+      </dsp:txXfrm>
+    </dsp:sp>
+    <dsp:sp modelId="{14483275-D448-415B-8470-2358E1DC79D7}">
+      <dsp:nvSpPr>
+        <dsp:cNvPr id="0" name=""/>
+        <dsp:cNvSpPr/>
+      </dsp:nvSpPr>
+      <dsp:spPr>
+        <a:xfrm>
+          <a:off x="5581650" y="2077094"/>
+          <a:ext cx="1202531" cy="601265"/>
+        </a:xfrm>
+        <a:prstGeom prst="roundRect">
+          <a:avLst>
+            <a:gd name="adj" fmla="val 10000"/>
+          </a:avLst>
+        </a:prstGeom>
+        <a:solidFill>
+          <a:schemeClr val="accent6">
+            <a:hueOff val="0"/>
+            <a:satOff val="0"/>
+            <a:lumOff val="0"/>
+            <a:alphaOff val="0"/>
+          </a:schemeClr>
+        </a:solidFill>
+        <a:ln w="55000" cap="flat" cmpd="thickThin" algn="ctr">
+          <a:solidFill>
+            <a:schemeClr val="lt1">
+              <a:hueOff val="0"/>
+              <a:satOff val="0"/>
+              <a:lumOff val="0"/>
+              <a:alphaOff val="0"/>
+            </a:schemeClr>
+          </a:solidFill>
+          <a:prstDash val="solid"/>
+        </a:ln>
+        <a:effectLst/>
+      </dsp:spPr>
+      <dsp:style>
+        <a:lnRef idx="2">
+          <a:scrgbClr r="0" g="0" b="0"/>
+        </a:lnRef>
+        <a:fillRef idx="1">
+          <a:scrgbClr r="0" g="0" b="0"/>
+        </a:fillRef>
+        <a:effectRef idx="0">
+          <a:scrgbClr r="0" g="0" b="0"/>
+        </a:effectRef>
+        <a:fontRef idx="minor">
+          <a:schemeClr val="lt1"/>
+        </a:fontRef>
+      </dsp:style>
+      <dsp:txBody>
+        <a:bodyPr spcFirstLastPara="0" vert="horz" wrap="square" lIns="9525" tIns="9525" rIns="9525" bIns="9525" numCol="1" spcCol="1270" anchor="ctr" anchorCtr="0">
+          <a:noAutofit/>
+        </a:bodyPr>
+        <a:lstStyle/>
+        <a:p>
+          <a:pPr lvl="0" algn="ctr" defTabSz="666750">
+            <a:lnSpc>
+              <a:spcPct val="90000"/>
+            </a:lnSpc>
+            <a:spcBef>
+              <a:spcPct val="0"/>
+            </a:spcBef>
+            <a:spcAft>
+              <a:spcPct val="35000"/>
+            </a:spcAft>
+          </a:pPr>
+          <a:r>
+            <a:rPr lang="en-US" sz="1500" kern="1200" dirty="0" smtClean="0"/>
+            <a:t>=, +=</a:t>
+          </a:r>
+          <a:endParaRPr lang="en-US" sz="1500" kern="1200" dirty="0"/>
+        </a:p>
+      </dsp:txBody>
+      <dsp:txXfrm>
+        <a:off x="5599260" y="2094704"/>
+        <a:ext cx="1167311" cy="566045"/>
+      </dsp:txXfrm>
+    </dsp:sp>
+    <dsp:sp modelId="{82CF57A2-9BFF-4BDC-9FEC-9095EC86E437}">
+      <dsp:nvSpPr>
+        <dsp:cNvPr id="0" name=""/>
+        <dsp:cNvSpPr/>
+      </dsp:nvSpPr>
+      <dsp:spPr>
+        <a:xfrm rot="3907178">
+          <a:off x="3085952" y="2537276"/>
+          <a:ext cx="1143294" cy="26630"/>
+        </a:xfrm>
+        <a:custGeom>
+          <a:avLst/>
+          <a:gdLst/>
+          <a:ahLst/>
+          <a:cxnLst/>
+          <a:rect l="0" t="0" r="0" b="0"/>
+          <a:pathLst>
+            <a:path>
+              <a:moveTo>
+                <a:pt x="0" y="13315"/>
+              </a:moveTo>
+              <a:lnTo>
+                <a:pt x="1143294" y="13315"/>
+              </a:lnTo>
+            </a:path>
+          </a:pathLst>
+        </a:custGeom>
+        <a:noFill/>
+        <a:ln w="55000" cap="flat" cmpd="thickThin" algn="ctr">
+          <a:solidFill>
+            <a:schemeClr val="accent5">
+              <a:hueOff val="0"/>
+              <a:satOff val="0"/>
+              <a:lumOff val="0"/>
+              <a:alphaOff val="0"/>
+            </a:schemeClr>
+          </a:solidFill>
+          <a:prstDash val="solid"/>
+        </a:ln>
+        <a:effectLst/>
+      </dsp:spPr>
+      <dsp:style>
+        <a:lnRef idx="2">
+          <a:scrgbClr r="0" g="0" b="0"/>
+        </a:lnRef>
+        <a:fillRef idx="0">
+          <a:scrgbClr r="0" g="0" b="0"/>
+        </a:fillRef>
+        <a:effectRef idx="0">
+          <a:scrgbClr r="0" g="0" b="0"/>
+        </a:effectRef>
+        <a:fontRef idx="minor"/>
+      </dsp:style>
+      <dsp:txBody>
+        <a:bodyPr spcFirstLastPara="0" vert="horz" wrap="square" lIns="12700" tIns="0" rIns="12700" bIns="0" numCol="1" spcCol="1270" anchor="ctr" anchorCtr="0">
+          <a:noAutofit/>
+        </a:bodyPr>
+        <a:lstStyle/>
+        <a:p>
+          <a:pPr lvl="0" algn="ctr" defTabSz="222250">
+            <a:lnSpc>
+              <a:spcPct val="90000"/>
+            </a:lnSpc>
+            <a:spcBef>
+              <a:spcPct val="0"/>
+            </a:spcBef>
+            <a:spcAft>
+              <a:spcPct val="35000"/>
+            </a:spcAft>
+          </a:pPr>
+          <a:endParaRPr lang="en-US" sz="500" kern="1200">
+            <a:solidFill>
+              <a:schemeClr val="tx1"/>
+            </a:solidFill>
+          </a:endParaRPr>
+        </a:p>
+      </dsp:txBody>
+      <dsp:txXfrm>
+        <a:off x="3629017" y="2522009"/>
+        <a:ext cx="57164" cy="57164"/>
+      </dsp:txXfrm>
+    </dsp:sp>
+    <dsp:sp modelId="{D2C72BA1-3DDE-4AB7-917B-32F319C3DC3D}">
+      <dsp:nvSpPr>
+        <dsp:cNvPr id="0" name=""/>
+        <dsp:cNvSpPr/>
+      </dsp:nvSpPr>
+      <dsp:spPr>
+        <a:xfrm>
+          <a:off x="3898106" y="2768550"/>
+          <a:ext cx="1202531" cy="601265"/>
+        </a:xfrm>
+        <a:prstGeom prst="roundRect">
+          <a:avLst>
+            <a:gd name="adj" fmla="val 10000"/>
+          </a:avLst>
+        </a:prstGeom>
+        <a:solidFill>
+          <a:schemeClr val="accent5">
+            <a:hueOff val="0"/>
+            <a:satOff val="0"/>
+            <a:lumOff val="0"/>
+            <a:alphaOff val="0"/>
+          </a:schemeClr>
+        </a:solidFill>
+        <a:ln w="55000" cap="flat" cmpd="thickThin" algn="ctr">
+          <a:solidFill>
+            <a:schemeClr val="lt1">
+              <a:hueOff val="0"/>
+              <a:satOff val="0"/>
+              <a:lumOff val="0"/>
+              <a:alphaOff val="0"/>
+            </a:schemeClr>
+          </a:solidFill>
+          <a:prstDash val="solid"/>
+        </a:ln>
+        <a:effectLst/>
+      </dsp:spPr>
+      <dsp:style>
+        <a:lnRef idx="2">
+          <a:scrgbClr r="0" g="0" b="0"/>
+        </a:lnRef>
+        <a:fillRef idx="1">
+          <a:scrgbClr r="0" g="0" b="0"/>
+        </a:fillRef>
+        <a:effectRef idx="0">
+          <a:scrgbClr r="0" g="0" b="0"/>
+        </a:effectRef>
+        <a:fontRef idx="minor">
+          <a:schemeClr val="lt1"/>
+        </a:fontRef>
+      </dsp:style>
+      <dsp:txBody>
+        <a:bodyPr spcFirstLastPara="0" vert="horz" wrap="square" lIns="9525" tIns="9525" rIns="9525" bIns="9525" numCol="1" spcCol="1270" anchor="ctr" anchorCtr="0">
+          <a:noAutofit/>
+        </a:bodyPr>
+        <a:lstStyle/>
+        <a:p>
+          <a:pPr lvl="0" algn="ctr" defTabSz="666750">
+            <a:lnSpc>
+              <a:spcPct val="90000"/>
+            </a:lnSpc>
+            <a:spcBef>
+              <a:spcPct val="0"/>
+            </a:spcBef>
+            <a:spcAft>
+              <a:spcPct val="35000"/>
+            </a:spcAft>
+          </a:pPr>
+          <a:r>
+            <a:rPr lang="en-US" sz="1500" kern="1200" dirty="0" smtClean="0"/>
+            <a:t>Logical</a:t>
+          </a:r>
+          <a:endParaRPr lang="en-US" sz="1500" kern="1200" dirty="0"/>
+        </a:p>
+      </dsp:txBody>
+      <dsp:txXfrm>
+        <a:off x="3915716" y="2786160"/>
+        <a:ext cx="1167311" cy="566045"/>
+      </dsp:txXfrm>
+    </dsp:sp>
+    <dsp:sp modelId="{D4B29442-F43F-44A1-9E2E-9C2FE1F6E2D4}">
+      <dsp:nvSpPr>
+        <dsp:cNvPr id="0" name=""/>
+        <dsp:cNvSpPr/>
+      </dsp:nvSpPr>
+      <dsp:spPr>
+        <a:xfrm>
+          <a:off x="5100637" y="3055867"/>
+          <a:ext cx="481012" cy="26630"/>
+        </a:xfrm>
+        <a:custGeom>
+          <a:avLst/>
+          <a:gdLst/>
+          <a:ahLst/>
+          <a:cxnLst/>
+          <a:rect l="0" t="0" r="0" b="0"/>
+          <a:pathLst>
+            <a:path>
+              <a:moveTo>
+                <a:pt x="0" y="13315"/>
+              </a:moveTo>
+              <a:lnTo>
+                <a:pt x="481012" y="13315"/>
+              </a:lnTo>
+            </a:path>
+          </a:pathLst>
+        </a:custGeom>
+        <a:noFill/>
+        <a:ln w="55000" cap="flat" cmpd="thickThin" algn="ctr">
+          <a:solidFill>
+            <a:schemeClr val="accent6">
+              <a:hueOff val="0"/>
+              <a:satOff val="0"/>
+              <a:lumOff val="0"/>
+              <a:alphaOff val="0"/>
+            </a:schemeClr>
+          </a:solidFill>
+          <a:prstDash val="solid"/>
+        </a:ln>
+        <a:effectLst/>
+      </dsp:spPr>
+      <dsp:style>
+        <a:lnRef idx="2">
+          <a:scrgbClr r="0" g="0" b="0"/>
+        </a:lnRef>
+        <a:fillRef idx="0">
+          <a:scrgbClr r="0" g="0" b="0"/>
+        </a:fillRef>
+        <a:effectRef idx="0">
+          <a:scrgbClr r="0" g="0" b="0"/>
+        </a:effectRef>
+        <a:fontRef idx="minor"/>
+      </dsp:style>
+      <dsp:txBody>
+        <a:bodyPr spcFirstLastPara="0" vert="horz" wrap="square" lIns="12700" tIns="0" rIns="12700" bIns="0" numCol="1" spcCol="1270" anchor="ctr" anchorCtr="0">
+          <a:noAutofit/>
+        </a:bodyPr>
+        <a:lstStyle/>
+        <a:p>
+          <a:pPr lvl="0" algn="ctr" defTabSz="222250">
+            <a:lnSpc>
+              <a:spcPct val="90000"/>
+            </a:lnSpc>
+            <a:spcBef>
+              <a:spcPct val="0"/>
+            </a:spcBef>
+            <a:spcAft>
+              <a:spcPct val="35000"/>
+            </a:spcAft>
+          </a:pPr>
+          <a:endParaRPr lang="en-US" sz="500" kern="1200">
+            <a:solidFill>
+              <a:schemeClr val="tx1"/>
+            </a:solidFill>
+          </a:endParaRPr>
+        </a:p>
+      </dsp:txBody>
+      <dsp:txXfrm>
+        <a:off x="5329118" y="3057157"/>
+        <a:ext cx="24050" cy="24050"/>
+      </dsp:txXfrm>
+    </dsp:sp>
+    <dsp:sp modelId="{60B7AE8D-6EEE-44D0-8C21-787636E412BD}">
+      <dsp:nvSpPr>
+        <dsp:cNvPr id="0" name=""/>
+        <dsp:cNvSpPr/>
+      </dsp:nvSpPr>
+      <dsp:spPr>
+        <a:xfrm>
+          <a:off x="5581650" y="2768550"/>
+          <a:ext cx="1202531" cy="601265"/>
+        </a:xfrm>
+        <a:prstGeom prst="roundRect">
+          <a:avLst>
+            <a:gd name="adj" fmla="val 10000"/>
+          </a:avLst>
+        </a:prstGeom>
+        <a:solidFill>
+          <a:schemeClr val="accent6">
+            <a:hueOff val="0"/>
+            <a:satOff val="0"/>
+            <a:lumOff val="0"/>
+            <a:alphaOff val="0"/>
+          </a:schemeClr>
+        </a:solidFill>
+        <a:ln w="55000" cap="flat" cmpd="thickThin" algn="ctr">
+          <a:solidFill>
+            <a:schemeClr val="lt1">
+              <a:hueOff val="0"/>
+              <a:satOff val="0"/>
+              <a:lumOff val="0"/>
+              <a:alphaOff val="0"/>
+            </a:schemeClr>
+          </a:solidFill>
+          <a:prstDash val="solid"/>
+        </a:ln>
+        <a:effectLst/>
+      </dsp:spPr>
+      <dsp:style>
+        <a:lnRef idx="2">
+          <a:scrgbClr r="0" g="0" b="0"/>
+        </a:lnRef>
+        <a:fillRef idx="1">
+          <a:scrgbClr r="0" g="0" b="0"/>
+        </a:fillRef>
+        <a:effectRef idx="0">
+          <a:scrgbClr r="0" g="0" b="0"/>
+        </a:effectRef>
+        <a:fontRef idx="minor">
+          <a:schemeClr val="lt1"/>
+        </a:fontRef>
+      </dsp:style>
+      <dsp:txBody>
+        <a:bodyPr spcFirstLastPara="0" vert="horz" wrap="square" lIns="9525" tIns="9525" rIns="9525" bIns="9525" numCol="1" spcCol="1270" anchor="ctr" anchorCtr="0">
+          <a:noAutofit/>
+        </a:bodyPr>
+        <a:lstStyle/>
+        <a:p>
+          <a:pPr lvl="0" algn="ctr" defTabSz="666750">
+            <a:lnSpc>
+              <a:spcPct val="90000"/>
+            </a:lnSpc>
+            <a:spcBef>
+              <a:spcPct val="0"/>
+            </a:spcBef>
+            <a:spcAft>
+              <a:spcPct val="35000"/>
+            </a:spcAft>
+          </a:pPr>
+          <a:r>
+            <a:rPr lang="en-US" sz="1500" kern="1200" dirty="0" smtClean="0"/>
+            <a:t>&amp;&amp;, ||</a:t>
+          </a:r>
+          <a:endParaRPr lang="en-US" sz="1500" kern="1200" dirty="0"/>
+        </a:p>
+      </dsp:txBody>
+      <dsp:txXfrm>
+        <a:off x="5599260" y="2786160"/>
+        <a:ext cx="1167311" cy="566045"/>
+      </dsp:txXfrm>
+    </dsp:sp>
+    <dsp:sp modelId="{2E900CF8-9339-44A3-8BB3-49EE157DFD36}">
+      <dsp:nvSpPr>
+        <dsp:cNvPr id="0" name=""/>
+        <dsp:cNvSpPr/>
+      </dsp:nvSpPr>
+      <dsp:spPr>
+        <a:xfrm rot="3560611">
+          <a:off x="716144" y="2893619"/>
+          <a:ext cx="1984804" cy="26630"/>
+        </a:xfrm>
+        <a:custGeom>
+          <a:avLst/>
+          <a:gdLst/>
+          <a:ahLst/>
+          <a:cxnLst/>
+          <a:rect l="0" t="0" r="0" b="0"/>
+          <a:pathLst>
+            <a:path>
+              <a:moveTo>
+                <a:pt x="0" y="13315"/>
+              </a:moveTo>
+              <a:lnTo>
+                <a:pt x="1984804" y="13315"/>
+              </a:lnTo>
+            </a:path>
+          </a:pathLst>
+        </a:custGeom>
+        <a:noFill/>
+        <a:ln w="55000" cap="flat" cmpd="thickThin" algn="ctr">
+          <a:solidFill>
+            <a:schemeClr val="accent4">
+              <a:hueOff val="0"/>
+              <a:satOff val="0"/>
+              <a:lumOff val="0"/>
+              <a:alphaOff val="0"/>
+            </a:schemeClr>
+          </a:solidFill>
+          <a:prstDash val="solid"/>
+        </a:ln>
+        <a:effectLst/>
+      </dsp:spPr>
+      <dsp:style>
+        <a:lnRef idx="2">
+          <a:scrgbClr r="0" g="0" b="0"/>
+        </a:lnRef>
+        <a:fillRef idx="0">
+          <a:scrgbClr r="0" g="0" b="0"/>
+        </a:fillRef>
+        <a:effectRef idx="0">
+          <a:scrgbClr r="0" g="0" b="0"/>
+        </a:effectRef>
+        <a:fontRef idx="minor"/>
+      </dsp:style>
+      <dsp:txBody>
+        <a:bodyPr spcFirstLastPara="0" vert="horz" wrap="square" lIns="12700" tIns="0" rIns="12700" bIns="0" numCol="1" spcCol="1270" anchor="ctr" anchorCtr="0">
+          <a:noAutofit/>
+        </a:bodyPr>
+        <a:lstStyle/>
+        <a:p>
+          <a:pPr lvl="0" algn="ctr" defTabSz="222250">
+            <a:lnSpc>
+              <a:spcPct val="90000"/>
+            </a:lnSpc>
+            <a:spcBef>
+              <a:spcPct val="0"/>
+            </a:spcBef>
+            <a:spcAft>
+              <a:spcPct val="35000"/>
+            </a:spcAft>
+          </a:pPr>
+          <a:endParaRPr lang="en-US" sz="500" kern="1200">
+            <a:solidFill>
+              <a:schemeClr val="tx1"/>
+            </a:solidFill>
+          </a:endParaRPr>
+        </a:p>
+      </dsp:txBody>
+      <dsp:txXfrm>
+        <a:off x="1658926" y="2857314"/>
+        <a:ext cx="99240" cy="99240"/>
+      </dsp:txXfrm>
+    </dsp:sp>
+    <dsp:sp modelId="{60869B68-1ED3-46EB-BC75-6C54E3547ABD}">
+      <dsp:nvSpPr>
+        <dsp:cNvPr id="0" name=""/>
+        <dsp:cNvSpPr/>
+      </dsp:nvSpPr>
+      <dsp:spPr>
+        <a:xfrm>
+          <a:off x="2214562" y="3460005"/>
+          <a:ext cx="1202531" cy="601265"/>
+        </a:xfrm>
+        <a:prstGeom prst="roundRect">
+          <a:avLst>
+            <a:gd name="adj" fmla="val 10000"/>
+          </a:avLst>
+        </a:prstGeom>
+        <a:solidFill>
+          <a:schemeClr val="accent4">
+            <a:hueOff val="0"/>
+            <a:satOff val="0"/>
+            <a:lumOff val="0"/>
+            <a:alphaOff val="0"/>
+          </a:schemeClr>
+        </a:solidFill>
+        <a:ln w="55000" cap="flat" cmpd="thickThin" algn="ctr">
+          <a:solidFill>
+            <a:schemeClr val="lt1">
+              <a:hueOff val="0"/>
+              <a:satOff val="0"/>
+              <a:lumOff val="0"/>
+              <a:alphaOff val="0"/>
+            </a:schemeClr>
+          </a:solidFill>
+          <a:prstDash val="solid"/>
+        </a:ln>
+        <a:effectLst/>
+      </dsp:spPr>
+      <dsp:style>
+        <a:lnRef idx="2">
+          <a:scrgbClr r="0" g="0" b="0"/>
+        </a:lnRef>
+        <a:fillRef idx="1">
+          <a:scrgbClr r="0" g="0" b="0"/>
+        </a:fillRef>
+        <a:effectRef idx="0">
+          <a:scrgbClr r="0" g="0" b="0"/>
+        </a:effectRef>
+        <a:fontRef idx="minor">
+          <a:schemeClr val="lt1"/>
+        </a:fontRef>
+      </dsp:style>
+      <dsp:txBody>
+        <a:bodyPr spcFirstLastPara="0" vert="horz" wrap="square" lIns="9525" tIns="9525" rIns="9525" bIns="9525" numCol="1" spcCol="1270" anchor="ctr" anchorCtr="0">
+          <a:noAutofit/>
+        </a:bodyPr>
+        <a:lstStyle/>
+        <a:p>
+          <a:pPr lvl="0" algn="ctr" defTabSz="666750">
+            <a:lnSpc>
+              <a:spcPct val="90000"/>
+            </a:lnSpc>
+            <a:spcBef>
+              <a:spcPct val="0"/>
+            </a:spcBef>
+            <a:spcAft>
+              <a:spcPct val="35000"/>
+            </a:spcAft>
+          </a:pPr>
+          <a:r>
+            <a:rPr lang="en-US" sz="1500" kern="1200" dirty="0" smtClean="0"/>
+            <a:t>Ternary</a:t>
+          </a:r>
+          <a:endParaRPr lang="en-US" sz="1500" kern="1200" dirty="0"/>
+        </a:p>
+      </dsp:txBody>
+      <dsp:txXfrm>
+        <a:off x="2232172" y="3477615"/>
+        <a:ext cx="1167311" cy="566045"/>
+      </dsp:txXfrm>
+    </dsp:sp>
+    <dsp:sp modelId="{E56F25DF-E7F6-42A2-9C4A-9E0CD9C0ADAE}">
+      <dsp:nvSpPr>
+        <dsp:cNvPr id="0" name=""/>
+        <dsp:cNvSpPr/>
+      </dsp:nvSpPr>
+      <dsp:spPr>
+        <a:xfrm>
+          <a:off x="3417093" y="3747323"/>
+          <a:ext cx="481012" cy="26630"/>
+        </a:xfrm>
+        <a:custGeom>
+          <a:avLst/>
+          <a:gdLst/>
+          <a:ahLst/>
+          <a:cxnLst/>
+          <a:rect l="0" t="0" r="0" b="0"/>
+          <a:pathLst>
+            <a:path>
+              <a:moveTo>
+                <a:pt x="0" y="13315"/>
+              </a:moveTo>
+              <a:lnTo>
+                <a:pt x="481012" y="13315"/>
+              </a:lnTo>
+            </a:path>
+          </a:pathLst>
+        </a:custGeom>
+        <a:noFill/>
+        <a:ln w="55000" cap="flat" cmpd="thickThin" algn="ctr">
+          <a:solidFill>
+            <a:schemeClr val="accent5">
+              <a:hueOff val="0"/>
+              <a:satOff val="0"/>
+              <a:lumOff val="0"/>
+              <a:alphaOff val="0"/>
+            </a:schemeClr>
+          </a:solidFill>
+          <a:prstDash val="solid"/>
+        </a:ln>
+        <a:effectLst/>
+      </dsp:spPr>
+      <dsp:style>
+        <a:lnRef idx="2">
+          <a:scrgbClr r="0" g="0" b="0"/>
+        </a:lnRef>
+        <a:fillRef idx="0">
+          <a:scrgbClr r="0" g="0" b="0"/>
+        </a:fillRef>
+        <a:effectRef idx="0">
+          <a:scrgbClr r="0" g="0" b="0"/>
+        </a:effectRef>
+        <a:fontRef idx="minor"/>
+      </dsp:style>
+      <dsp:txBody>
+        <a:bodyPr spcFirstLastPara="0" vert="horz" wrap="square" lIns="12700" tIns="0" rIns="12700" bIns="0" numCol="1" spcCol="1270" anchor="ctr" anchorCtr="0">
+          <a:noAutofit/>
+        </a:bodyPr>
+        <a:lstStyle/>
+        <a:p>
+          <a:pPr lvl="0" algn="ctr" defTabSz="222250">
+            <a:lnSpc>
+              <a:spcPct val="90000"/>
+            </a:lnSpc>
+            <a:spcBef>
+              <a:spcPct val="0"/>
+            </a:spcBef>
+            <a:spcAft>
+              <a:spcPct val="35000"/>
+            </a:spcAft>
+          </a:pPr>
+          <a:endParaRPr lang="en-US" sz="500" kern="1200">
+            <a:solidFill>
+              <a:schemeClr val="tx1"/>
+            </a:solidFill>
+          </a:endParaRPr>
+        </a:p>
+      </dsp:txBody>
+      <dsp:txXfrm>
+        <a:off x="3645574" y="3748613"/>
+        <a:ext cx="24050" cy="24050"/>
+      </dsp:txXfrm>
+    </dsp:sp>
+    <dsp:sp modelId="{E7395C0D-6957-446C-9E91-1E365C003190}">
+      <dsp:nvSpPr>
+        <dsp:cNvPr id="0" name=""/>
+        <dsp:cNvSpPr/>
+      </dsp:nvSpPr>
+      <dsp:spPr>
+        <a:xfrm>
+          <a:off x="3898106" y="3460005"/>
+          <a:ext cx="1202531" cy="601265"/>
+        </a:xfrm>
+        <a:prstGeom prst="roundRect">
+          <a:avLst>
+            <a:gd name="adj" fmla="val 10000"/>
+          </a:avLst>
+        </a:prstGeom>
+        <a:solidFill>
+          <a:schemeClr val="accent5">
+            <a:hueOff val="0"/>
+            <a:satOff val="0"/>
+            <a:lumOff val="0"/>
+            <a:alphaOff val="0"/>
+          </a:schemeClr>
+        </a:solidFill>
+        <a:ln w="55000" cap="flat" cmpd="thickThin" algn="ctr">
+          <a:solidFill>
+            <a:schemeClr val="lt1">
+              <a:hueOff val="0"/>
+              <a:satOff val="0"/>
+              <a:lumOff val="0"/>
+              <a:alphaOff val="0"/>
+            </a:schemeClr>
+          </a:solidFill>
+          <a:prstDash val="solid"/>
+        </a:ln>
+        <a:effectLst/>
+      </dsp:spPr>
+      <dsp:style>
+        <a:lnRef idx="2">
+          <a:scrgbClr r="0" g="0" b="0"/>
+        </a:lnRef>
+        <a:fillRef idx="1">
+          <a:scrgbClr r="0" g="0" b="0"/>
+        </a:fillRef>
+        <a:effectRef idx="0">
+          <a:scrgbClr r="0" g="0" b="0"/>
+        </a:effectRef>
+        <a:fontRef idx="minor">
+          <a:schemeClr val="lt1"/>
+        </a:fontRef>
+      </dsp:style>
+      <dsp:txBody>
+        <a:bodyPr spcFirstLastPara="0" vert="horz" wrap="square" lIns="9525" tIns="9525" rIns="9525" bIns="9525" numCol="1" spcCol="1270" anchor="ctr" anchorCtr="0">
+          <a:noAutofit/>
+        </a:bodyPr>
+        <a:lstStyle/>
+        <a:p>
+          <a:pPr lvl="0" algn="ctr" defTabSz="666750">
+            <a:lnSpc>
+              <a:spcPct val="90000"/>
+            </a:lnSpc>
+            <a:spcBef>
+              <a:spcPct val="0"/>
+            </a:spcBef>
+            <a:spcAft>
+              <a:spcPct val="35000"/>
+            </a:spcAft>
+          </a:pPr>
+          <a:r>
+            <a:rPr lang="en-US" sz="1500" kern="1200" smtClean="0"/>
+            <a:t>?:</a:t>
+          </a:r>
+          <a:endParaRPr lang="en-US" sz="1500" kern="1200" dirty="0"/>
+        </a:p>
+      </dsp:txBody>
+      <dsp:txXfrm>
+        <a:off x="3915716" y="3477615"/>
+        <a:ext cx="1167311" cy="566045"/>
+      </dsp:txXfrm>
+    </dsp:sp>
   </dsp:spTree>
 </dsp:drawing>
 </file>
@@ -3724,6 +5896,526 @@
       <dsp:cNvGrpSpPr/>
     </dsp:nvGrpSpPr>
     <dsp:grpSpPr/>
+    <dsp:sp modelId="{11203129-CBA1-4DED-91CA-0BF4930CF855}">
+      <dsp:nvSpPr>
+        <dsp:cNvPr id="0" name=""/>
+        <dsp:cNvSpPr/>
+      </dsp:nvSpPr>
+      <dsp:spPr>
+        <a:xfrm>
+          <a:off x="3616" y="880563"/>
+          <a:ext cx="1581224" cy="948734"/>
+        </a:xfrm>
+        <a:prstGeom prst="roundRect">
+          <a:avLst>
+            <a:gd name="adj" fmla="val 10000"/>
+          </a:avLst>
+        </a:prstGeom>
+        <a:solidFill>
+          <a:schemeClr val="accent2">
+            <a:hueOff val="0"/>
+            <a:satOff val="0"/>
+            <a:lumOff val="0"/>
+            <a:alphaOff val="0"/>
+          </a:schemeClr>
+        </a:solidFill>
+        <a:ln w="55000" cap="flat" cmpd="thickThin" algn="ctr">
+          <a:solidFill>
+            <a:schemeClr val="lt1">
+              <a:hueOff val="0"/>
+              <a:satOff val="0"/>
+              <a:lumOff val="0"/>
+              <a:alphaOff val="0"/>
+            </a:schemeClr>
+          </a:solidFill>
+          <a:prstDash val="solid"/>
+        </a:ln>
+        <a:effectLst/>
+      </dsp:spPr>
+      <dsp:style>
+        <a:lnRef idx="2">
+          <a:scrgbClr r="0" g="0" b="0"/>
+        </a:lnRef>
+        <a:fillRef idx="1">
+          <a:scrgbClr r="0" g="0" b="0"/>
+        </a:fillRef>
+        <a:effectRef idx="0">
+          <a:scrgbClr r="0" g="0" b="0"/>
+        </a:effectRef>
+        <a:fontRef idx="minor">
+          <a:schemeClr val="lt1"/>
+        </a:fontRef>
+      </dsp:style>
+      <dsp:txBody>
+        <a:bodyPr spcFirstLastPara="0" vert="horz" wrap="square" lIns="76200" tIns="76200" rIns="76200" bIns="76200" numCol="1" spcCol="1270" anchor="ctr" anchorCtr="0">
+          <a:noAutofit/>
+        </a:bodyPr>
+        <a:lstStyle/>
+        <a:p>
+          <a:pPr lvl="0" algn="ctr" defTabSz="889000">
+            <a:lnSpc>
+              <a:spcPct val="90000"/>
+            </a:lnSpc>
+            <a:spcBef>
+              <a:spcPct val="0"/>
+            </a:spcBef>
+            <a:spcAft>
+              <a:spcPct val="35000"/>
+            </a:spcAft>
+          </a:pPr>
+          <a:r>
+            <a:rPr lang="en-US" sz="2000" kern="1200" dirty="0" smtClean="0"/>
+            <a:t>Select Workspace </a:t>
+          </a:r>
+          <a:endParaRPr lang="en-IN" sz="2000" kern="1200" dirty="0"/>
+        </a:p>
+      </dsp:txBody>
+      <dsp:txXfrm>
+        <a:off x="31403" y="908350"/>
+        <a:ext cx="1525650" cy="893160"/>
+      </dsp:txXfrm>
+    </dsp:sp>
+    <dsp:sp modelId="{1C0B9D56-00E6-4402-9CA8-6839E6360C68}">
+      <dsp:nvSpPr>
+        <dsp:cNvPr id="0" name=""/>
+        <dsp:cNvSpPr/>
+      </dsp:nvSpPr>
+      <dsp:spPr>
+        <a:xfrm>
+          <a:off x="1742963" y="1158859"/>
+          <a:ext cx="335219" cy="392143"/>
+        </a:xfrm>
+        <a:prstGeom prst="rightArrow">
+          <a:avLst>
+            <a:gd name="adj1" fmla="val 60000"/>
+            <a:gd name="adj2" fmla="val 50000"/>
+          </a:avLst>
+        </a:prstGeom>
+        <a:solidFill>
+          <a:schemeClr val="accent2">
+            <a:hueOff val="0"/>
+            <a:satOff val="0"/>
+            <a:lumOff val="0"/>
+            <a:alphaOff val="0"/>
+          </a:schemeClr>
+        </a:solidFill>
+        <a:ln>
+          <a:noFill/>
+        </a:ln>
+        <a:effectLst/>
+      </dsp:spPr>
+      <dsp:style>
+        <a:lnRef idx="0">
+          <a:scrgbClr r="0" g="0" b="0"/>
+        </a:lnRef>
+        <a:fillRef idx="1">
+          <a:scrgbClr r="0" g="0" b="0"/>
+        </a:fillRef>
+        <a:effectRef idx="0">
+          <a:scrgbClr r="0" g="0" b="0"/>
+        </a:effectRef>
+        <a:fontRef idx="minor">
+          <a:schemeClr val="lt1"/>
+        </a:fontRef>
+      </dsp:style>
+      <dsp:txBody>
+        <a:bodyPr spcFirstLastPara="0" vert="horz" wrap="square" lIns="0" tIns="0" rIns="0" bIns="0" numCol="1" spcCol="1270" anchor="ctr" anchorCtr="0">
+          <a:noAutofit/>
+        </a:bodyPr>
+        <a:lstStyle/>
+        <a:p>
+          <a:pPr lvl="0" algn="ctr" defTabSz="577850">
+            <a:lnSpc>
+              <a:spcPct val="90000"/>
+            </a:lnSpc>
+            <a:spcBef>
+              <a:spcPct val="0"/>
+            </a:spcBef>
+            <a:spcAft>
+              <a:spcPct val="35000"/>
+            </a:spcAft>
+          </a:pPr>
+          <a:endParaRPr lang="en-IN" sz="1300" kern="1200"/>
+        </a:p>
+      </dsp:txBody>
+      <dsp:txXfrm>
+        <a:off x="1742963" y="1237288"/>
+        <a:ext cx="234653" cy="235285"/>
+      </dsp:txXfrm>
+    </dsp:sp>
+    <dsp:sp modelId="{8D47A1A4-1949-43A1-A8F0-E0E91F30DC45}">
+      <dsp:nvSpPr>
+        <dsp:cNvPr id="0" name=""/>
+        <dsp:cNvSpPr/>
+      </dsp:nvSpPr>
+      <dsp:spPr>
+        <a:xfrm>
+          <a:off x="2217330" y="880563"/>
+          <a:ext cx="1581224" cy="948734"/>
+        </a:xfrm>
+        <a:prstGeom prst="roundRect">
+          <a:avLst>
+            <a:gd name="adj" fmla="val 10000"/>
+          </a:avLst>
+        </a:prstGeom>
+        <a:solidFill>
+          <a:schemeClr val="accent2">
+            <a:hueOff val="-6721062"/>
+            <a:satOff val="2923"/>
+            <a:lumOff val="850"/>
+            <a:alphaOff val="0"/>
+          </a:schemeClr>
+        </a:solidFill>
+        <a:ln w="55000" cap="flat" cmpd="thickThin" algn="ctr">
+          <a:solidFill>
+            <a:schemeClr val="lt1">
+              <a:hueOff val="0"/>
+              <a:satOff val="0"/>
+              <a:lumOff val="0"/>
+              <a:alphaOff val="0"/>
+            </a:schemeClr>
+          </a:solidFill>
+          <a:prstDash val="solid"/>
+        </a:ln>
+        <a:effectLst/>
+      </dsp:spPr>
+      <dsp:style>
+        <a:lnRef idx="2">
+          <a:scrgbClr r="0" g="0" b="0"/>
+        </a:lnRef>
+        <a:fillRef idx="1">
+          <a:scrgbClr r="0" g="0" b="0"/>
+        </a:fillRef>
+        <a:effectRef idx="0">
+          <a:scrgbClr r="0" g="0" b="0"/>
+        </a:effectRef>
+        <a:fontRef idx="minor">
+          <a:schemeClr val="lt1"/>
+        </a:fontRef>
+      </dsp:style>
+      <dsp:txBody>
+        <a:bodyPr spcFirstLastPara="0" vert="horz" wrap="square" lIns="76200" tIns="76200" rIns="76200" bIns="76200" numCol="1" spcCol="1270" anchor="ctr" anchorCtr="0">
+          <a:noAutofit/>
+        </a:bodyPr>
+        <a:lstStyle/>
+        <a:p>
+          <a:pPr lvl="0" algn="ctr" defTabSz="889000">
+            <a:lnSpc>
+              <a:spcPct val="90000"/>
+            </a:lnSpc>
+            <a:spcBef>
+              <a:spcPct val="0"/>
+            </a:spcBef>
+            <a:spcAft>
+              <a:spcPct val="35000"/>
+            </a:spcAft>
+          </a:pPr>
+          <a:r>
+            <a:rPr lang="en-US" sz="2000" kern="1200" dirty="0" smtClean="0"/>
+            <a:t>Create Project</a:t>
+          </a:r>
+          <a:endParaRPr lang="en-IN" sz="2000" kern="1200" dirty="0"/>
+        </a:p>
+      </dsp:txBody>
+      <dsp:txXfrm>
+        <a:off x="2245117" y="908350"/>
+        <a:ext cx="1525650" cy="893160"/>
+      </dsp:txXfrm>
+    </dsp:sp>
+    <dsp:sp modelId="{3947C9CA-D4DA-4FDB-B929-B16B5097A4E7}">
+      <dsp:nvSpPr>
+        <dsp:cNvPr id="0" name=""/>
+        <dsp:cNvSpPr/>
+      </dsp:nvSpPr>
+      <dsp:spPr>
+        <a:xfrm>
+          <a:off x="3956677" y="1158859"/>
+          <a:ext cx="335219" cy="392143"/>
+        </a:xfrm>
+        <a:prstGeom prst="rightArrow">
+          <a:avLst>
+            <a:gd name="adj1" fmla="val 60000"/>
+            <a:gd name="adj2" fmla="val 50000"/>
+          </a:avLst>
+        </a:prstGeom>
+        <a:solidFill>
+          <a:schemeClr val="accent2">
+            <a:hueOff val="-10081593"/>
+            <a:satOff val="4384"/>
+            <a:lumOff val="1275"/>
+            <a:alphaOff val="0"/>
+          </a:schemeClr>
+        </a:solidFill>
+        <a:ln>
+          <a:noFill/>
+        </a:ln>
+        <a:effectLst/>
+      </dsp:spPr>
+      <dsp:style>
+        <a:lnRef idx="0">
+          <a:scrgbClr r="0" g="0" b="0"/>
+        </a:lnRef>
+        <a:fillRef idx="1">
+          <a:scrgbClr r="0" g="0" b="0"/>
+        </a:fillRef>
+        <a:effectRef idx="0">
+          <a:scrgbClr r="0" g="0" b="0"/>
+        </a:effectRef>
+        <a:fontRef idx="minor">
+          <a:schemeClr val="lt1"/>
+        </a:fontRef>
+      </dsp:style>
+      <dsp:txBody>
+        <a:bodyPr spcFirstLastPara="0" vert="horz" wrap="square" lIns="0" tIns="0" rIns="0" bIns="0" numCol="1" spcCol="1270" anchor="ctr" anchorCtr="0">
+          <a:noAutofit/>
+        </a:bodyPr>
+        <a:lstStyle/>
+        <a:p>
+          <a:pPr lvl="0" algn="ctr" defTabSz="577850">
+            <a:lnSpc>
+              <a:spcPct val="90000"/>
+            </a:lnSpc>
+            <a:spcBef>
+              <a:spcPct val="0"/>
+            </a:spcBef>
+            <a:spcAft>
+              <a:spcPct val="35000"/>
+            </a:spcAft>
+          </a:pPr>
+          <a:endParaRPr lang="en-IN" sz="1300" kern="1200"/>
+        </a:p>
+      </dsp:txBody>
+      <dsp:txXfrm>
+        <a:off x="3956677" y="1237288"/>
+        <a:ext cx="234653" cy="235285"/>
+      </dsp:txXfrm>
+    </dsp:sp>
+    <dsp:sp modelId="{614E5B5D-D0F0-4D42-B442-A9EB514D4F62}">
+      <dsp:nvSpPr>
+        <dsp:cNvPr id="0" name=""/>
+        <dsp:cNvSpPr/>
+      </dsp:nvSpPr>
+      <dsp:spPr>
+        <a:xfrm>
+          <a:off x="4431044" y="880563"/>
+          <a:ext cx="1581224" cy="948734"/>
+        </a:xfrm>
+        <a:prstGeom prst="roundRect">
+          <a:avLst>
+            <a:gd name="adj" fmla="val 10000"/>
+          </a:avLst>
+        </a:prstGeom>
+        <a:solidFill>
+          <a:schemeClr val="accent2">
+            <a:hueOff val="-13442124"/>
+            <a:satOff val="5846"/>
+            <a:lumOff val="1700"/>
+            <a:alphaOff val="0"/>
+          </a:schemeClr>
+        </a:solidFill>
+        <a:ln w="55000" cap="flat" cmpd="thickThin" algn="ctr">
+          <a:solidFill>
+            <a:schemeClr val="lt1">
+              <a:hueOff val="0"/>
+              <a:satOff val="0"/>
+              <a:lumOff val="0"/>
+              <a:alphaOff val="0"/>
+            </a:schemeClr>
+          </a:solidFill>
+          <a:prstDash val="solid"/>
+        </a:ln>
+        <a:effectLst/>
+      </dsp:spPr>
+      <dsp:style>
+        <a:lnRef idx="2">
+          <a:scrgbClr r="0" g="0" b="0"/>
+        </a:lnRef>
+        <a:fillRef idx="1">
+          <a:scrgbClr r="0" g="0" b="0"/>
+        </a:fillRef>
+        <a:effectRef idx="0">
+          <a:scrgbClr r="0" g="0" b="0"/>
+        </a:effectRef>
+        <a:fontRef idx="minor">
+          <a:schemeClr val="lt1"/>
+        </a:fontRef>
+      </dsp:style>
+      <dsp:txBody>
+        <a:bodyPr spcFirstLastPara="0" vert="horz" wrap="square" lIns="76200" tIns="76200" rIns="76200" bIns="76200" numCol="1" spcCol="1270" anchor="ctr" anchorCtr="0">
+          <a:noAutofit/>
+        </a:bodyPr>
+        <a:lstStyle/>
+        <a:p>
+          <a:pPr lvl="0" algn="ctr" defTabSz="889000">
+            <a:lnSpc>
+              <a:spcPct val="90000"/>
+            </a:lnSpc>
+            <a:spcBef>
+              <a:spcPct val="0"/>
+            </a:spcBef>
+            <a:spcAft>
+              <a:spcPct val="35000"/>
+            </a:spcAft>
+          </a:pPr>
+          <a:r>
+            <a:rPr lang="en-US" sz="2000" kern="1200" dirty="0" smtClean="0"/>
+            <a:t>Package</a:t>
+          </a:r>
+          <a:endParaRPr lang="en-IN" sz="2000" kern="1200" dirty="0"/>
+        </a:p>
+      </dsp:txBody>
+      <dsp:txXfrm>
+        <a:off x="4458831" y="908350"/>
+        <a:ext cx="1525650" cy="893160"/>
+      </dsp:txXfrm>
+    </dsp:sp>
+    <dsp:sp modelId="{08622866-E60F-4800-830E-D8E1DD94831F}">
+      <dsp:nvSpPr>
+        <dsp:cNvPr id="0" name=""/>
+        <dsp:cNvSpPr/>
+      </dsp:nvSpPr>
+      <dsp:spPr>
+        <a:xfrm>
+          <a:off x="6170391" y="1158859"/>
+          <a:ext cx="335219" cy="392143"/>
+        </a:xfrm>
+        <a:prstGeom prst="rightArrow">
+          <a:avLst>
+            <a:gd name="adj1" fmla="val 60000"/>
+            <a:gd name="adj2" fmla="val 50000"/>
+          </a:avLst>
+        </a:prstGeom>
+        <a:solidFill>
+          <a:schemeClr val="accent2">
+            <a:hueOff val="-20163186"/>
+            <a:satOff val="8769"/>
+            <a:lumOff val="2550"/>
+            <a:alphaOff val="0"/>
+          </a:schemeClr>
+        </a:solidFill>
+        <a:ln>
+          <a:noFill/>
+        </a:ln>
+        <a:effectLst/>
+      </dsp:spPr>
+      <dsp:style>
+        <a:lnRef idx="0">
+          <a:scrgbClr r="0" g="0" b="0"/>
+        </a:lnRef>
+        <a:fillRef idx="1">
+          <a:scrgbClr r="0" g="0" b="0"/>
+        </a:fillRef>
+        <a:effectRef idx="0">
+          <a:scrgbClr r="0" g="0" b="0"/>
+        </a:effectRef>
+        <a:fontRef idx="minor">
+          <a:schemeClr val="lt1"/>
+        </a:fontRef>
+      </dsp:style>
+      <dsp:txBody>
+        <a:bodyPr spcFirstLastPara="0" vert="horz" wrap="square" lIns="0" tIns="0" rIns="0" bIns="0" numCol="1" spcCol="1270" anchor="ctr" anchorCtr="0">
+          <a:noAutofit/>
+        </a:bodyPr>
+        <a:lstStyle/>
+        <a:p>
+          <a:pPr lvl="0" algn="ctr" defTabSz="577850">
+            <a:lnSpc>
+              <a:spcPct val="90000"/>
+            </a:lnSpc>
+            <a:spcBef>
+              <a:spcPct val="0"/>
+            </a:spcBef>
+            <a:spcAft>
+              <a:spcPct val="35000"/>
+            </a:spcAft>
+          </a:pPr>
+          <a:endParaRPr lang="en-IN" sz="1300" kern="1200"/>
+        </a:p>
+      </dsp:txBody>
+      <dsp:txXfrm>
+        <a:off x="6170391" y="1237288"/>
+        <a:ext cx="234653" cy="235285"/>
+      </dsp:txXfrm>
+    </dsp:sp>
+    <dsp:sp modelId="{C6504757-BE93-4F6E-9AF5-3592CCA06DF2}">
+      <dsp:nvSpPr>
+        <dsp:cNvPr id="0" name=""/>
+        <dsp:cNvSpPr/>
+      </dsp:nvSpPr>
+      <dsp:spPr>
+        <a:xfrm>
+          <a:off x="6644759" y="880563"/>
+          <a:ext cx="1581224" cy="948734"/>
+        </a:xfrm>
+        <a:prstGeom prst="roundRect">
+          <a:avLst>
+            <a:gd name="adj" fmla="val 10000"/>
+          </a:avLst>
+        </a:prstGeom>
+        <a:solidFill>
+          <a:schemeClr val="accent2">
+            <a:hueOff val="-20163186"/>
+            <a:satOff val="8769"/>
+            <a:lumOff val="2550"/>
+            <a:alphaOff val="0"/>
+          </a:schemeClr>
+        </a:solidFill>
+        <a:ln w="55000" cap="flat" cmpd="thickThin" algn="ctr">
+          <a:solidFill>
+            <a:schemeClr val="lt1">
+              <a:hueOff val="0"/>
+              <a:satOff val="0"/>
+              <a:lumOff val="0"/>
+              <a:alphaOff val="0"/>
+            </a:schemeClr>
+          </a:solidFill>
+          <a:prstDash val="solid"/>
+        </a:ln>
+        <a:effectLst/>
+      </dsp:spPr>
+      <dsp:style>
+        <a:lnRef idx="2">
+          <a:scrgbClr r="0" g="0" b="0"/>
+        </a:lnRef>
+        <a:fillRef idx="1">
+          <a:scrgbClr r="0" g="0" b="0"/>
+        </a:fillRef>
+        <a:effectRef idx="0">
+          <a:scrgbClr r="0" g="0" b="0"/>
+        </a:effectRef>
+        <a:fontRef idx="minor">
+          <a:schemeClr val="lt1"/>
+        </a:fontRef>
+      </dsp:style>
+      <dsp:txBody>
+        <a:bodyPr spcFirstLastPara="0" vert="horz" wrap="square" lIns="76200" tIns="76200" rIns="76200" bIns="76200" numCol="1" spcCol="1270" anchor="ctr" anchorCtr="0">
+          <a:noAutofit/>
+        </a:bodyPr>
+        <a:lstStyle/>
+        <a:p>
+          <a:pPr lvl="0" algn="ctr" defTabSz="889000">
+            <a:lnSpc>
+              <a:spcPct val="90000"/>
+            </a:lnSpc>
+            <a:spcBef>
+              <a:spcPct val="0"/>
+            </a:spcBef>
+            <a:spcAft>
+              <a:spcPct val="35000"/>
+            </a:spcAft>
+          </a:pPr>
+          <a:r>
+            <a:rPr lang="en-US" sz="2000" kern="1200" dirty="0" smtClean="0"/>
+            <a:t>Class (Program)</a:t>
+          </a:r>
+          <a:endParaRPr lang="en-IN" sz="2000" kern="1200" dirty="0"/>
+        </a:p>
+      </dsp:txBody>
+      <dsp:txXfrm>
+        <a:off x="6672546" y="908350"/>
+        <a:ext cx="1525650" cy="893160"/>
+      </dsp:txXfrm>
+    </dsp:sp>
   </dsp:spTree>
 </dsp:drawing>
 </file>
@@ -6345,7 +9037,7 @@
             <a:fld id="{C9CD41DD-2995-4DF1-86B6-6F421C18E4C3}" type="datetimeFigureOut">
               <a:rPr lang="en-US" smtClean="0"/>
               <a:pPr/>
-              <a:t>12/14/2025</a:t>
+              <a:t>12/21/2025</a:t>
             </a:fld>
             <a:endParaRPr lang="en-IN"/>
           </a:p>
@@ -7329,7 +10021,7 @@
             <a:fld id="{C77E4C06-FCC2-4C21-BF50-8A2E8941F588}" type="datetimeFigureOut">
               <a:rPr lang="en-US" smtClean="0"/>
               <a:pPr/>
-              <a:t>12/14/2025</a:t>
+              <a:t>12/21/2025</a:t>
             </a:fld>
             <a:endParaRPr lang="en-US"/>
           </a:p>
@@ -7553,7 +10245,7 @@
             <a:fld id="{C77E4C06-FCC2-4C21-BF50-8A2E8941F588}" type="datetimeFigureOut">
               <a:rPr lang="en-US" smtClean="0"/>
               <a:pPr/>
-              <a:t>12/14/2025</a:t>
+              <a:t>12/21/2025</a:t>
             </a:fld>
             <a:endParaRPr lang="en-US"/>
           </a:p>
@@ -7740,7 +10432,7 @@
             <a:fld id="{C77E4C06-FCC2-4C21-BF50-8A2E8941F588}" type="datetimeFigureOut">
               <a:rPr lang="en-US" smtClean="0"/>
               <a:pPr/>
-              <a:t>12/14/2025</a:t>
+              <a:t>12/21/2025</a:t>
             </a:fld>
             <a:endParaRPr lang="en-US"/>
           </a:p>
@@ -7892,7 +10584,7 @@
             <a:fld id="{C77E4C06-FCC2-4C21-BF50-8A2E8941F588}" type="datetimeFigureOut">
               <a:rPr lang="en-US" smtClean="0"/>
               <a:pPr/>
-              <a:t>12/14/2025</a:t>
+              <a:t>12/21/2025</a:t>
             </a:fld>
             <a:endParaRPr lang="en-US"/>
           </a:p>
@@ -8149,7 +10841,7 @@
             <a:fld id="{C77E4C06-FCC2-4C21-BF50-8A2E8941F588}" type="datetimeFigureOut">
               <a:rPr lang="en-US" smtClean="0"/>
               <a:pPr/>
-              <a:t>12/14/2025</a:t>
+              <a:t>12/21/2025</a:t>
             </a:fld>
             <a:endParaRPr lang="en-US"/>
           </a:p>
@@ -8560,7 +11252,7 @@
             <a:fld id="{C77E4C06-FCC2-4C21-BF50-8A2E8941F588}" type="datetimeFigureOut">
               <a:rPr lang="en-US" smtClean="0"/>
               <a:pPr/>
-              <a:t>12/14/2025</a:t>
+              <a:t>12/21/2025</a:t>
             </a:fld>
             <a:endParaRPr lang="en-US"/>
           </a:p>
@@ -9008,7 +11700,7 @@
             <a:fld id="{C77E4C06-FCC2-4C21-BF50-8A2E8941F588}" type="datetimeFigureOut">
               <a:rPr lang="en-US" smtClean="0"/>
               <a:pPr/>
-              <a:t>12/14/2025</a:t>
+              <a:t>12/21/2025</a:t>
             </a:fld>
             <a:endParaRPr lang="en-US"/>
           </a:p>
@@ -9137,7 +11829,7 @@
             <a:fld id="{C77E4C06-FCC2-4C21-BF50-8A2E8941F588}" type="datetimeFigureOut">
               <a:rPr lang="en-US" smtClean="0"/>
               <a:pPr/>
-              <a:t>12/14/2025</a:t>
+              <a:t>12/21/2025</a:t>
             </a:fld>
             <a:endParaRPr lang="en-US"/>
           </a:p>
@@ -9260,7 +11952,7 @@
             <a:fld id="{C77E4C06-FCC2-4C21-BF50-8A2E8941F588}" type="datetimeFigureOut">
               <a:rPr lang="en-US" smtClean="0"/>
               <a:pPr/>
-              <a:t>12/14/2025</a:t>
+              <a:t>12/21/2025</a:t>
             </a:fld>
             <a:endParaRPr lang="en-US"/>
           </a:p>
@@ -9536,7 +12228,7 @@
             <a:fld id="{C77E4C06-FCC2-4C21-BF50-8A2E8941F588}" type="datetimeFigureOut">
               <a:rPr lang="en-US" smtClean="0"/>
               <a:pPr/>
-              <a:t>12/14/2025</a:t>
+              <a:t>12/21/2025</a:t>
             </a:fld>
             <a:endParaRPr lang="en-US"/>
           </a:p>
@@ -9769,7 +12461,7 @@
             <a:fld id="{C77E4C06-FCC2-4C21-BF50-8A2E8941F588}" type="datetimeFigureOut">
               <a:rPr lang="en-US" smtClean="0"/>
               <a:pPr/>
-              <a:t>12/14/2025</a:t>
+              <a:t>12/21/2025</a:t>
             </a:fld>
             <a:endParaRPr lang="en-US"/>
           </a:p>
@@ -10906,7 +13598,7 @@
             <a:fld id="{C77E4C06-FCC2-4C21-BF50-8A2E8941F588}" type="datetimeFigureOut">
               <a:rPr lang="en-US" smtClean="0"/>
               <a:pPr/>
-              <a:t>12/14/2025</a:t>
+              <a:t>12/21/2025</a:t>
             </a:fld>
             <a:endParaRPr lang="en-US"/>
           </a:p>
@@ -15168,8 +17860,23 @@
           <a:p>
             <a:r>
               <a:rPr lang="en-US" dirty="0" smtClean="0"/>
-              <a:t>switch-case selected one block of case from multiple blocks</a:t>
-            </a:r>
+              <a:t>switch-case selected one block of case from multiple </a:t>
+            </a:r>
+            <a:r>
+              <a:rPr lang="en-US" dirty="0" smtClean="0"/>
+              <a:t>blocks</a:t>
+            </a:r>
+          </a:p>
+          <a:p>
+            <a:r>
+              <a:rPr lang="en-US" dirty="0" smtClean="0"/>
+              <a:t>default executes when any one of the case is </a:t>
+            </a:r>
+            <a:r>
+              <a:rPr lang="en-US" smtClean="0"/>
+              <a:t>not matched.</a:t>
+            </a:r>
+            <a:endParaRPr lang="en-US" dirty="0" smtClean="0"/>
           </a:p>
           <a:p>
             <a:r>
@@ -16083,15 +18790,7 @@
           <a:p>
             <a:r>
               <a:rPr lang="en-US" dirty="0" smtClean="0"/>
-              <a:t>Origin name was </a:t>
-            </a:r>
-            <a:r>
-              <a:rPr lang="en-US" dirty="0" smtClean="0"/>
-              <a:t>OOK </a:t>
-            </a:r>
-            <a:r>
-              <a:rPr lang="en-US" dirty="0" smtClean="0"/>
-              <a:t>later renamed as Java.</a:t>
+              <a:t>Origin name was OOK later renamed as Java.</a:t>
             </a:r>
           </a:p>
         </p:txBody>
@@ -18517,11 +21216,7 @@
             </a:r>
             <a:r>
               <a:rPr lang="en-US" dirty="0" smtClean="0"/>
-              <a:t>, Shape (Class, Project &amp; </a:t>
-            </a:r>
-            <a:r>
-              <a:rPr lang="en-US" dirty="0" smtClean="0"/>
-              <a:t>Package</a:t>
+              <a:t>, Shape (Class, Project &amp; Package</a:t>
             </a:r>
             <a:r>
               <a:rPr lang="en-US" smtClean="0"/>

</xml_diff>